<commit_message>
Fix previous bad commit
</commit_message>
<xml_diff>
--- a/3DSystem/DOC/Status.pptx
+++ b/3DSystem/DOC/Status.pptx
@@ -9645,7 +9645,7 @@
             <a:prstTxWarp prst="textNoShape">
               <a:avLst/>
             </a:prstTxWarp>
-            <a:normAutofit fontScale="70000" lnSpcReduction="20000"/>
+            <a:normAutofit fontScale="62500" lnSpcReduction="20000"/>
           </a:bodyPr>
           <a:lstStyle>
             <a:lvl1pPr marL="382059" indent="-382059" algn="l" defTabSz="509412" rtl="0" eaLnBrk="1" fontAlgn="base" hangingPunct="1">
@@ -9838,8 +9838,20 @@
             <a:pPr lvl="2"/>
             <a:r>
               <a:rPr lang="en-US" dirty="0" smtClean="0"/>
-              <a:t>process set of instructions which implement a NN</a:t>
-            </a:r>
+              <a:t>process set of instructions which implement a </a:t>
+            </a:r>
+            <a:r>
+              <a:rPr lang="en-US" dirty="0" smtClean="0"/>
+              <a:t>NN</a:t>
+            </a:r>
+          </a:p>
+          <a:p>
+            <a:pPr lvl="2"/>
+            <a:r>
+              <a:rPr lang="en-US" dirty="0" smtClean="0"/>
+              <a:t>manage configuration of PE and communication of results</a:t>
+            </a:r>
+            <a:endParaRPr lang="en-US" dirty="0" smtClean="0"/>
           </a:p>
           <a:p>
             <a:pPr lvl="1"/>
@@ -9849,21 +9861,34 @@
             </a:r>
           </a:p>
           <a:p>
-            <a:pPr lvl="1"/>
-            <a:r>
-              <a:rPr lang="en-US" dirty="0" smtClean="0"/>
-              <a:t>take data from DRAM via stack bus</a:t>
-            </a:r>
-          </a:p>
-          <a:p>
-            <a:pPr lvl="1"/>
-            <a:r>
-              <a:rPr lang="en-US" dirty="0" smtClean="0"/>
-              <a:t>operate on data without local storage</a:t>
-            </a:r>
-          </a:p>
-          <a:p>
-            <a:pPr lvl="1"/>
+            <a:pPr lvl="2"/>
+            <a:r>
+              <a:rPr lang="en-US" dirty="0" smtClean="0"/>
+              <a:t>take data </a:t>
+            </a:r>
+            <a:r>
+              <a:rPr lang="en-US" dirty="0" smtClean="0"/>
+              <a:t>from Manager/ </a:t>
+            </a:r>
+            <a:r>
+              <a:rPr lang="en-US" dirty="0" smtClean="0"/>
+              <a:t>DRAM via stack bus</a:t>
+            </a:r>
+          </a:p>
+          <a:p>
+            <a:pPr lvl="2"/>
+            <a:r>
+              <a:rPr lang="en-US" dirty="0" smtClean="0"/>
+              <a:t>operate on data </a:t>
+            </a:r>
+            <a:r>
+              <a:rPr lang="en-US" dirty="0" smtClean="0"/>
+              <a:t>at line rate to generate neuron activations</a:t>
+            </a:r>
+            <a:endParaRPr lang="en-US" dirty="0" smtClean="0"/>
+          </a:p>
+          <a:p>
+            <a:pPr lvl="2"/>
             <a:r>
               <a:rPr lang="en-US" dirty="0" smtClean="0"/>
               <a:t>silicon focused on processing required not storage</a:t>
@@ -13439,7 +13464,6 @@
               <a:rPr lang="en-US" dirty="0" smtClean="0"/>
               <a:t>ead descriptors pointers to memory read modules to send operation arguments down stack bus to PE</a:t>
             </a:r>
-            <a:endParaRPr lang="en-US" dirty="0" smtClean="0"/>
           </a:p>
         </p:txBody>
       </p:sp>

</xml_diff>

<commit_message>
PY: put address in msb of readmem file so we can tolerate address width changes
</commit_message>
<xml_diff>
--- a/3DSystem/DOC/Status.pptx
+++ b/3DSystem/DOC/Status.pptx
@@ -5,10 +5,10 @@
     <p:sldMasterId id="2147483648" r:id="rId1"/>
   </p:sldMasterIdLst>
   <p:notesMasterIdLst>
-    <p:notesMasterId r:id="rId32"/>
+    <p:notesMasterId r:id="rId34"/>
   </p:notesMasterIdLst>
   <p:handoutMasterIdLst>
-    <p:handoutMasterId r:id="rId33"/>
+    <p:handoutMasterId r:id="rId35"/>
   </p:handoutMasterIdLst>
   <p:sldIdLst>
     <p:sldId id="256" r:id="rId2"/>
@@ -21,26 +21,28 @@
     <p:sldId id="352" r:id="rId9"/>
     <p:sldId id="419" r:id="rId10"/>
     <p:sldId id="296" r:id="rId11"/>
-    <p:sldId id="351" r:id="rId12"/>
-    <p:sldId id="298" r:id="rId13"/>
-    <p:sldId id="299" r:id="rId14"/>
-    <p:sldId id="304" r:id="rId15"/>
-    <p:sldId id="423" r:id="rId16"/>
-    <p:sldId id="429" r:id="rId17"/>
-    <p:sldId id="436" r:id="rId18"/>
-    <p:sldId id="433" r:id="rId19"/>
-    <p:sldId id="310" r:id="rId20"/>
-    <p:sldId id="300" r:id="rId21"/>
-    <p:sldId id="317" r:id="rId22"/>
-    <p:sldId id="314" r:id="rId23"/>
-    <p:sldId id="318" r:id="rId24"/>
-    <p:sldId id="426" r:id="rId25"/>
-    <p:sldId id="424" r:id="rId26"/>
-    <p:sldId id="425" r:id="rId27"/>
-    <p:sldId id="427" r:id="rId28"/>
-    <p:sldId id="428" r:id="rId29"/>
-    <p:sldId id="431" r:id="rId30"/>
-    <p:sldId id="432" r:id="rId31"/>
+    <p:sldId id="437" r:id="rId12"/>
+    <p:sldId id="351" r:id="rId13"/>
+    <p:sldId id="298" r:id="rId14"/>
+    <p:sldId id="438" r:id="rId15"/>
+    <p:sldId id="299" r:id="rId16"/>
+    <p:sldId id="304" r:id="rId17"/>
+    <p:sldId id="423" r:id="rId18"/>
+    <p:sldId id="429" r:id="rId19"/>
+    <p:sldId id="436" r:id="rId20"/>
+    <p:sldId id="433" r:id="rId21"/>
+    <p:sldId id="310" r:id="rId22"/>
+    <p:sldId id="300" r:id="rId23"/>
+    <p:sldId id="317" r:id="rId24"/>
+    <p:sldId id="314" r:id="rId25"/>
+    <p:sldId id="318" r:id="rId26"/>
+    <p:sldId id="426" r:id="rId27"/>
+    <p:sldId id="424" r:id="rId28"/>
+    <p:sldId id="425" r:id="rId29"/>
+    <p:sldId id="427" r:id="rId30"/>
+    <p:sldId id="428" r:id="rId31"/>
+    <p:sldId id="431" r:id="rId32"/>
+    <p:sldId id="432" r:id="rId33"/>
   </p:sldIdLst>
   <p:sldSz cx="10058400" cy="7772400"/>
   <p:notesSz cx="9144000" cy="6858000"/>
@@ -254,7 +256,7 @@
           <a:p>
             <a:fld id="{57A4C361-2F1D-434C-AB4F-1596B4F81233}" type="datetimeFigureOut">
               <a:rPr lang="en-US" smtClean="0"/>
-              <a:t>5/4/17</a:t>
+              <a:t>6/5/17</a:t>
             </a:fld>
             <a:endParaRPr lang="en-US"/>
           </a:p>
@@ -420,7 +422,7 @@
           <a:p>
             <a:fld id="{E7D6BC09-F59F-8C49-A658-977B3A0C7D29}" type="datetimeFigureOut">
               <a:rPr lang="en-US" smtClean="0"/>
-              <a:t>5/4/17</a:t>
+              <a:t>6/5/17</a:t>
             </a:fld>
             <a:endParaRPr lang="en-US"/>
           </a:p>
@@ -1420,7 +1422,7 @@
           <a:p>
             <a:fld id="{5CB6EAA8-FD5A-4B40-9E09-3071A0E8F69E}" type="slidenum">
               <a:rPr lang="en-US" smtClean="0"/>
-              <a:t>11</a:t>
+              <a:t>12</a:t>
             </a:fld>
             <a:endParaRPr lang="en-US"/>
           </a:p>
@@ -1504,7 +1506,7 @@
           <a:p>
             <a:fld id="{5CB6EAA8-FD5A-4B40-9E09-3071A0E8F69E}" type="slidenum">
               <a:rPr lang="en-US" smtClean="0"/>
-              <a:t>12</a:t>
+              <a:t>13</a:t>
             </a:fld>
             <a:endParaRPr lang="en-US"/>
           </a:p>
@@ -1588,7 +1590,7 @@
           <a:p>
             <a:fld id="{5CB6EAA8-FD5A-4B40-9E09-3071A0E8F69E}" type="slidenum">
               <a:rPr lang="en-US" smtClean="0"/>
-              <a:t>13</a:t>
+              <a:t>15</a:t>
             </a:fld>
             <a:endParaRPr lang="en-US"/>
           </a:p>
@@ -1863,7 +1865,7 @@
           <a:p>
             <a:fld id="{5CB6EAA8-FD5A-4B40-9E09-3071A0E8F69E}" type="slidenum">
               <a:rPr lang="en-US" smtClean="0"/>
-              <a:t>14</a:t>
+              <a:t>16</a:t>
             </a:fld>
             <a:endParaRPr lang="en-US"/>
           </a:p>
@@ -1947,7 +1949,7 @@
           <a:p>
             <a:fld id="{5CB6EAA8-FD5A-4B40-9E09-3071A0E8F69E}" type="slidenum">
               <a:rPr lang="en-US" smtClean="0"/>
-              <a:t>19</a:t>
+              <a:t>21</a:t>
             </a:fld>
             <a:endParaRPr lang="en-US"/>
           </a:p>
@@ -2031,7 +2033,7 @@
           <a:p>
             <a:fld id="{5CB6EAA8-FD5A-4B40-9E09-3071A0E8F69E}" type="slidenum">
               <a:rPr lang="en-US" smtClean="0"/>
-              <a:t>20</a:t>
+              <a:t>22</a:t>
             </a:fld>
             <a:endParaRPr lang="en-US"/>
           </a:p>
@@ -2154,7 +2156,7 @@
           <a:p>
             <a:fld id="{5CB6EAA8-FD5A-4B40-9E09-3071A0E8F69E}" type="slidenum">
               <a:rPr lang="en-US" smtClean="0"/>
-              <a:t>21</a:t>
+              <a:t>23</a:t>
             </a:fld>
             <a:endParaRPr lang="en-US"/>
           </a:p>
@@ -2238,7 +2240,7 @@
           <a:p>
             <a:fld id="{5CB6EAA8-FD5A-4B40-9E09-3071A0E8F69E}" type="slidenum">
               <a:rPr lang="en-US" smtClean="0"/>
-              <a:t>22</a:t>
+              <a:t>24</a:t>
             </a:fld>
             <a:endParaRPr lang="en-US"/>
           </a:p>
@@ -2368,7 +2370,7 @@
           <a:p>
             <a:fld id="{5CB6EAA8-FD5A-4B40-9E09-3071A0E8F69E}" type="slidenum">
               <a:rPr lang="en-US" smtClean="0"/>
-              <a:t>23</a:t>
+              <a:t>25</a:t>
             </a:fld>
             <a:endParaRPr lang="en-US"/>
           </a:p>
@@ -2452,7 +2454,7 @@
           <a:p>
             <a:fld id="{5CB6EAA8-FD5A-4B40-9E09-3071A0E8F69E}" type="slidenum">
               <a:rPr lang="en-US" smtClean="0"/>
-              <a:t>25</a:t>
+              <a:t>27</a:t>
             </a:fld>
             <a:endParaRPr lang="en-US"/>
           </a:p>
@@ -2770,7 +2772,7 @@
           <a:p>
             <a:fld id="{5CB6EAA8-FD5A-4B40-9E09-3071A0E8F69E}" type="slidenum">
               <a:rPr lang="en-US" smtClean="0"/>
-              <a:t>26</a:t>
+              <a:t>28</a:t>
             </a:fld>
             <a:endParaRPr lang="en-US"/>
           </a:p>
@@ -3871,7 +3873,7 @@
             </a:pPr>
             <a:fld id="{E8FA995C-F779-9D43-9D07-0702230452DC}" type="datetime1">
               <a:rPr lang="en-US" smtClean="0"/>
-              <a:t>5/4/17</a:t>
+              <a:t>6/5/17</a:t>
             </a:fld>
             <a:endParaRPr lang="en-US"/>
           </a:p>
@@ -4069,7 +4071,7 @@
             </a:pPr>
             <a:fld id="{1685B35A-56B7-F745-9DC2-7818D0E153AD}" type="datetime1">
               <a:rPr lang="en-US" smtClean="0"/>
-              <a:t>5/4/17</a:t>
+              <a:t>6/5/17</a:t>
             </a:fld>
             <a:endParaRPr lang="en-US"/>
           </a:p>
@@ -4277,7 +4279,7 @@
             </a:pPr>
             <a:fld id="{8370476A-D274-2B4B-9341-F0CA5725C047}" type="datetime1">
               <a:rPr lang="en-US" smtClean="0"/>
-              <a:t>5/4/17</a:t>
+              <a:t>6/5/17</a:t>
             </a:fld>
             <a:endParaRPr lang="en-US"/>
           </a:p>
@@ -4475,7 +4477,7 @@
             </a:pPr>
             <a:fld id="{E035E851-60D7-4747-B089-B29A39F8F8C9}" type="datetime1">
               <a:rPr lang="en-US" smtClean="0"/>
-              <a:t>5/4/17</a:t>
+              <a:t>6/5/17</a:t>
             </a:fld>
             <a:endParaRPr lang="en-US"/>
           </a:p>
@@ -4749,7 +4751,7 @@
             </a:pPr>
             <a:fld id="{5366A2EC-4BBA-064A-BBD8-24A504C0262E}" type="datetime1">
               <a:rPr lang="en-US" smtClean="0"/>
-              <a:t>5/4/17</a:t>
+              <a:t>6/5/17</a:t>
             </a:fld>
             <a:endParaRPr lang="en-US"/>
           </a:p>
@@ -5065,7 +5067,7 @@
             </a:pPr>
             <a:fld id="{C271364D-AC7D-B04A-A5C7-091C013179B4}" type="datetime1">
               <a:rPr lang="en-US" smtClean="0"/>
-              <a:t>5/4/17</a:t>
+              <a:t>6/5/17</a:t>
             </a:fld>
             <a:endParaRPr lang="en-US"/>
           </a:p>
@@ -5515,7 +5517,7 @@
             </a:pPr>
             <a:fld id="{03058B32-2B20-8345-BC3E-4D678DE02C1B}" type="datetime1">
               <a:rPr lang="en-US" smtClean="0"/>
-              <a:t>5/4/17</a:t>
+              <a:t>6/5/17</a:t>
             </a:fld>
             <a:endParaRPr lang="en-US"/>
           </a:p>
@@ -5661,7 +5663,7 @@
             </a:pPr>
             <a:fld id="{E29255B5-0BD9-2E4D-9639-E4B1CDBDF424}" type="datetime1">
               <a:rPr lang="en-US" smtClean="0"/>
-              <a:t>5/4/17</a:t>
+              <a:t>6/5/17</a:t>
             </a:fld>
             <a:endParaRPr lang="en-US"/>
           </a:p>
@@ -5784,7 +5786,7 @@
             </a:pPr>
             <a:fld id="{24B760E5-4661-374A-8BE7-AF9125E022A7}" type="datetime1">
               <a:rPr lang="en-US" smtClean="0"/>
-              <a:t>5/4/17</a:t>
+              <a:t>6/5/17</a:t>
             </a:fld>
             <a:endParaRPr lang="en-US"/>
           </a:p>
@@ -6089,7 +6091,7 @@
             </a:pPr>
             <a:fld id="{6D94035C-1FC7-7748-BA94-9B2A284454AA}" type="datetime1">
               <a:rPr lang="en-US" smtClean="0"/>
-              <a:t>5/4/17</a:t>
+              <a:t>6/5/17</a:t>
             </a:fld>
             <a:endParaRPr lang="en-US"/>
           </a:p>
@@ -6377,7 +6379,7 @@
             </a:pPr>
             <a:fld id="{D996993F-01D7-DA4A-A7BC-9E30F81FEB76}" type="datetime1">
               <a:rPr lang="en-US" smtClean="0"/>
-              <a:t>5/4/17</a:t>
+              <a:t>6/5/17</a:t>
             </a:fld>
             <a:endParaRPr lang="en-US"/>
           </a:p>
@@ -6686,7 +6688,7 @@
             </a:pPr>
             <a:fld id="{D50342C8-954C-8A4F-90C9-6391BCCFAFAB}" type="datetime1">
               <a:rPr lang="en-US" smtClean="0"/>
-              <a:t>5/4/17</a:t>
+              <a:t>6/5/17</a:t>
             </a:fld>
             <a:endParaRPr lang="en-US" dirty="0"/>
           </a:p>
@@ -8006,41 +8008,8 @@
                 <a:ea typeface="+mn-ea"/>
                 <a:cs typeface="Monaco"/>
               </a:rPr>
-              <a:t>Tezzaron DiRAM4 – wide DDR – </a:t>
-            </a:r>
-            <a:r>
-              <a:rPr lang="en-US" b="1" dirty="0" smtClean="0">
-                <a:ln w="1905"/>
-                <a:solidFill>
-                  <a:schemeClr val="tx1"/>
-                </a:solidFill>
-                <a:effectLst>
-                  <a:innerShdw blurRad="69850" dist="43180" dir="5400000">
-                    <a:srgbClr val="000000">
-                      <a:alpha val="65000"/>
-                    </a:srgbClr>
-                  </a:innerShdw>
-                </a:effectLst>
-                <a:ea typeface="+mn-ea"/>
-                <a:cs typeface="Monaco"/>
-              </a:rPr>
-              <a:t>4Tbps</a:t>
-            </a:r>
-            <a:endParaRPr lang="en-US" b="1" dirty="0" smtClean="0">
-              <a:ln w="1905"/>
-              <a:solidFill>
-                <a:schemeClr val="tx1"/>
-              </a:solidFill>
-              <a:effectLst>
-                <a:innerShdw blurRad="69850" dist="43180" dir="5400000">
-                  <a:srgbClr val="000000">
-                    <a:alpha val="65000"/>
-                  </a:srgbClr>
-                </a:innerShdw>
-              </a:effectLst>
-              <a:ea typeface="+mn-ea"/>
-              <a:cs typeface="Monaco"/>
-            </a:endParaRPr>
+              <a:t>Tezzaron DiRAM4 – wide DDR – 4Tbps</a:t>
+            </a:r>
           </a:p>
         </p:txBody>
       </p:sp>
@@ -8083,350 +8052,46 @@
       </p:grpSpPr>
       <p:sp>
         <p:nvSpPr>
-          <p:cNvPr id="3" name="Content Placeholder 2"/>
-          <p:cNvSpPr>
-            <a:spLocks noGrp="1"/>
-          </p:cNvSpPr>
-          <p:nvPr>
-            <p:ph idx="1"/>
+          <p:cNvPr id="2" name="Title 1"/>
+          <p:cNvSpPr>
+            <a:spLocks noGrp="1"/>
+          </p:cNvSpPr>
+          <p:nvPr>
+            <p:ph type="title"/>
           </p:nvPr>
         </p:nvSpPr>
         <p:spPr>
           <a:xfrm>
-            <a:off x="502920" y="1590100"/>
-            <a:ext cx="9052560" cy="5792555"/>
+            <a:off x="502920" y="583248"/>
+            <a:ext cx="9052560" cy="1210839"/>
           </a:xfrm>
         </p:spPr>
         <p:txBody>
-          <a:bodyPr>
-            <a:normAutofit fontScale="92500" lnSpcReduction="20000"/>
-          </a:bodyPr>
+          <a:bodyPr/>
           <a:lstStyle/>
           <a:p>
-            <a:pPr fontAlgn="auto">
-              <a:spcAft>
-                <a:spcPts val="669"/>
-              </a:spcAft>
-              <a:defRPr/>
-            </a:pPr>
-            <a:r>
-              <a:rPr lang="en-US" dirty="0" smtClean="0">
-                <a:solidFill>
-                  <a:srgbClr val="000000"/>
-                </a:solidFill>
-                <a:cs typeface="Monaco"/>
-              </a:rPr>
-              <a:t>Architecture includes:</a:t>
-            </a:r>
-          </a:p>
-          <a:p>
-            <a:pPr lvl="1" fontAlgn="auto">
-              <a:spcAft>
-                <a:spcPts val="669"/>
-              </a:spcAft>
-              <a:defRPr/>
-            </a:pPr>
-            <a:r>
-              <a:rPr lang="en-US" dirty="0" smtClean="0">
-                <a:solidFill>
-                  <a:srgbClr val="000000"/>
-                </a:solidFill>
-                <a:cs typeface="Monaco"/>
-              </a:rPr>
-              <a:t>Custom </a:t>
-            </a:r>
-            <a:r>
-              <a:rPr lang="en-US" dirty="0">
-                <a:solidFill>
-                  <a:srgbClr val="000000"/>
-                </a:solidFill>
-                <a:cs typeface="Monaco"/>
-              </a:rPr>
-              <a:t>organized 3D-</a:t>
-            </a:r>
-            <a:r>
-              <a:rPr lang="en-US" dirty="0" smtClean="0">
-                <a:solidFill>
-                  <a:srgbClr val="000000"/>
-                </a:solidFill>
-                <a:cs typeface="Monaco"/>
-              </a:rPr>
-              <a:t>DRAM </a:t>
-            </a:r>
-            <a:r>
-              <a:rPr lang="en-US" dirty="0" smtClean="0">
-                <a:solidFill>
-                  <a:srgbClr val="000000"/>
-                </a:solidFill>
-                <a:cs typeface="Monaco"/>
-              </a:rPr>
-              <a:t>specification</a:t>
-            </a:r>
-          </a:p>
-          <a:p>
-            <a:pPr lvl="2" fontAlgn="auto">
-              <a:spcAft>
-                <a:spcPts val="669"/>
-              </a:spcAft>
-              <a:defRPr/>
-            </a:pPr>
-            <a:r>
-              <a:rPr lang="en-US" dirty="0" smtClean="0">
-                <a:solidFill>
-                  <a:srgbClr val="000000"/>
-                </a:solidFill>
-                <a:cs typeface="Monaco"/>
-              </a:rPr>
-              <a:t>allows constant streaming of data to PE avoiding local storage</a:t>
-            </a:r>
-            <a:endParaRPr lang="en-US" dirty="0" smtClean="0">
-              <a:solidFill>
-                <a:srgbClr val="000000"/>
-              </a:solidFill>
-              <a:cs typeface="Monaco"/>
-            </a:endParaRPr>
-          </a:p>
-          <a:p>
-            <a:pPr lvl="1" fontAlgn="auto">
-              <a:spcAft>
-                <a:spcPts val="669"/>
-              </a:spcAft>
-              <a:defRPr/>
-            </a:pPr>
-            <a:r>
-              <a:rPr lang="en-US" dirty="0" smtClean="0">
-                <a:solidFill>
-                  <a:srgbClr val="000000"/>
-                </a:solidFill>
-                <a:cs typeface="Monaco"/>
-              </a:rPr>
-              <a:t>Data Structures specific to each ANN</a:t>
-            </a:r>
-            <a:endParaRPr lang="en-US" dirty="0">
-              <a:solidFill>
-                <a:srgbClr val="000000"/>
-              </a:solidFill>
-              <a:cs typeface="Monaco"/>
-            </a:endParaRPr>
-          </a:p>
-          <a:p>
-            <a:pPr lvl="1" fontAlgn="auto">
-              <a:spcAft>
-                <a:spcPts val="669"/>
-              </a:spcAft>
-              <a:defRPr/>
-            </a:pPr>
-            <a:r>
-              <a:rPr lang="en-US" dirty="0">
-                <a:solidFill>
-                  <a:srgbClr val="000000"/>
-                </a:solidFill>
-                <a:cs typeface="Monaco"/>
-              </a:rPr>
-              <a:t>Management Layer </a:t>
-            </a:r>
-            <a:r>
-              <a:rPr lang="en-US" dirty="0" smtClean="0">
-                <a:solidFill>
-                  <a:srgbClr val="000000"/>
-                </a:solidFill>
-                <a:cs typeface="Monaco"/>
-              </a:rPr>
-              <a:t>for configuration and control</a:t>
-            </a:r>
-          </a:p>
-          <a:p>
-            <a:pPr lvl="1" fontAlgn="auto">
-              <a:spcAft>
-                <a:spcPts val="669"/>
-              </a:spcAft>
-              <a:defRPr/>
-            </a:pPr>
-            <a:r>
-              <a:rPr lang="en-US" dirty="0" smtClean="0">
-                <a:solidFill>
-                  <a:srgbClr val="000000"/>
-                </a:solidFill>
-                <a:cs typeface="Monaco"/>
-              </a:rPr>
-              <a:t>Processing layer(s) targeted toward a family of ANNs</a:t>
-            </a:r>
-          </a:p>
-          <a:p>
-            <a:pPr lvl="2" fontAlgn="auto">
-              <a:spcAft>
-                <a:spcPts val="669"/>
-              </a:spcAft>
-              <a:defRPr/>
-            </a:pPr>
-            <a:r>
-              <a:rPr lang="en-US" dirty="0" smtClean="0">
-                <a:solidFill>
-                  <a:srgbClr val="000000"/>
-                </a:solidFill>
-                <a:cs typeface="Monaco"/>
-              </a:rPr>
-              <a:t>array of processing engines (PE) with special streaming functions</a:t>
-            </a:r>
-            <a:endParaRPr lang="en-US" dirty="0">
-              <a:solidFill>
-                <a:srgbClr val="000000"/>
-              </a:solidFill>
-              <a:cs typeface="Monaco"/>
-            </a:endParaRPr>
-          </a:p>
-          <a:p>
-            <a:pPr lvl="2" fontAlgn="auto">
-              <a:spcAft>
-                <a:spcPts val="669"/>
-              </a:spcAft>
-              <a:defRPr/>
-            </a:pPr>
-            <a:r>
-              <a:rPr lang="en-US" dirty="0" smtClean="0">
-                <a:solidFill>
-                  <a:srgbClr val="000000"/>
-                </a:solidFill>
-                <a:cs typeface="Monaco"/>
-              </a:rPr>
-              <a:t>PE </a:t>
-            </a:r>
-            <a:r>
-              <a:rPr lang="en-US" dirty="0" smtClean="0">
-                <a:solidFill>
-                  <a:srgbClr val="000000"/>
-                </a:solidFill>
-                <a:cs typeface="Monaco"/>
-              </a:rPr>
-              <a:t>includes </a:t>
-            </a:r>
-            <a:r>
-              <a:rPr lang="en-US" dirty="0" smtClean="0">
-                <a:solidFill>
-                  <a:srgbClr val="000000"/>
-                </a:solidFill>
-                <a:cs typeface="Monaco"/>
-              </a:rPr>
-              <a:t>small </a:t>
-            </a:r>
-            <a:r>
-              <a:rPr lang="en-US" dirty="0" smtClean="0">
-                <a:solidFill>
-                  <a:srgbClr val="000000"/>
-                </a:solidFill>
-                <a:cs typeface="Monaco"/>
-              </a:rPr>
-              <a:t>SIMD unit to </a:t>
-            </a:r>
-            <a:r>
-              <a:rPr lang="en-US" dirty="0">
-                <a:solidFill>
-                  <a:srgbClr val="000000"/>
-                </a:solidFill>
-                <a:cs typeface="Monaco"/>
-              </a:rPr>
-              <a:t>process non hot-spot functions and provide some </a:t>
-            </a:r>
-            <a:r>
-              <a:rPr lang="en-US" dirty="0" smtClean="0">
-                <a:solidFill>
-                  <a:srgbClr val="000000"/>
-                </a:solidFill>
-                <a:cs typeface="Monaco"/>
-              </a:rPr>
-              <a:t>generality</a:t>
-            </a:r>
-          </a:p>
-          <a:p>
-            <a:pPr fontAlgn="auto">
-              <a:spcAft>
-                <a:spcPts val="669"/>
-              </a:spcAft>
-              <a:defRPr/>
-            </a:pPr>
-            <a:r>
-              <a:rPr lang="en-US" dirty="0" smtClean="0">
-                <a:solidFill>
-                  <a:srgbClr val="000000"/>
-                </a:solidFill>
-                <a:cs typeface="Monaco"/>
-              </a:rPr>
-              <a:t>3D solution contained within the footprint of available DRAM</a:t>
-            </a:r>
-          </a:p>
-          <a:p>
-            <a:pPr lvl="1" fontAlgn="auto">
-              <a:spcAft>
-                <a:spcPts val="669"/>
-              </a:spcAft>
-              <a:defRPr/>
-            </a:pPr>
-            <a:r>
-              <a:rPr lang="en-US" dirty="0" smtClean="0">
-                <a:solidFill>
-                  <a:srgbClr val="000000"/>
-                </a:solidFill>
-                <a:cs typeface="Monaco"/>
-              </a:rPr>
-              <a:t>allows use of TSV’s for memory interface</a:t>
-            </a:r>
-          </a:p>
-          <a:p>
-            <a:pPr lvl="1" fontAlgn="auto">
-              <a:spcAft>
-                <a:spcPts val="669"/>
-              </a:spcAft>
-              <a:defRPr/>
-            </a:pPr>
-            <a:r>
-              <a:rPr lang="en-US" dirty="0" smtClean="0">
-                <a:solidFill>
-                  <a:srgbClr val="000000"/>
-                </a:solidFill>
-                <a:cs typeface="Monaco"/>
-              </a:rPr>
-              <a:t>PE provides 32 execution lanes within the footprint</a:t>
-            </a:r>
-          </a:p>
-          <a:p>
-            <a:pPr lvl="1" fontAlgn="auto">
-              <a:spcAft>
-                <a:spcPts val="669"/>
-              </a:spcAft>
-              <a:defRPr/>
-            </a:pPr>
-            <a:r>
-              <a:rPr lang="en-US" dirty="0" smtClean="0">
-                <a:solidFill>
-                  <a:srgbClr val="000000"/>
-                </a:solidFill>
-                <a:cs typeface="Monaco"/>
-              </a:rPr>
-              <a:t>minimal use of local SRAM allows PE and manager logic to fit within footprint</a:t>
-            </a:r>
-            <a:endParaRPr lang="en-US" dirty="0" smtClean="0">
-              <a:solidFill>
-                <a:srgbClr val="000000"/>
-              </a:solidFill>
-              <a:cs typeface="Monaco"/>
-            </a:endParaRPr>
-          </a:p>
-        </p:txBody>
-      </p:sp>
-      <p:sp>
-        <p:nvSpPr>
-          <p:cNvPr id="2" name="Title 1"/>
-          <p:cNvSpPr>
-            <a:spLocks noGrp="1"/>
-          </p:cNvSpPr>
-          <p:nvPr>
-            <p:ph type="title"/>
+            <a:r>
+              <a:rPr lang="en-US" dirty="0" smtClean="0"/>
+              <a:t>Solution</a:t>
+            </a:r>
+            <a:endParaRPr lang="en-US" dirty="0"/>
+          </a:p>
+        </p:txBody>
+      </p:sp>
+      <p:sp>
+        <p:nvSpPr>
+          <p:cNvPr id="3" name="Content Placeholder 2"/>
+          <p:cNvSpPr>
+            <a:spLocks noGrp="1"/>
+          </p:cNvSpPr>
+          <p:nvPr>
+            <p:ph idx="1"/>
           </p:nvPr>
         </p:nvSpPr>
         <p:spPr>
           <a:xfrm>
-            <a:off x="502920" y="587223"/>
-            <a:ext cx="9052560" cy="865813"/>
+            <a:off x="502920" y="2003215"/>
+            <a:ext cx="9052560" cy="3517371"/>
           </a:xfrm>
         </p:spPr>
         <p:txBody>
@@ -8434,16 +8099,53 @@
           <a:lstStyle/>
           <a:p>
             <a:r>
-              <a:rPr lang="en-US" dirty="0" smtClean="0"/>
-              <a:t>Solution</a:t>
-            </a:r>
-            <a:endParaRPr lang="en-US" dirty="0"/>
-          </a:p>
-        </p:txBody>
-      </p:sp>
-      <p:sp>
-        <p:nvSpPr>
-          <p:cNvPr id="5" name="Slide Number Placeholder 4"/>
+              <a:rPr lang="en-US" dirty="0"/>
+              <a:t>U</a:t>
+            </a:r>
+            <a:r>
+              <a:rPr lang="en-US" dirty="0" smtClean="0"/>
+              <a:t>tilize DRAM as the primary processing memory</a:t>
+            </a:r>
+          </a:p>
+          <a:p>
+            <a:pPr lvl="1"/>
+            <a:r>
+              <a:rPr lang="en-US" dirty="0" smtClean="0"/>
+              <a:t>allows support of locally and fully connected NNs</a:t>
+            </a:r>
+          </a:p>
+          <a:p>
+            <a:pPr lvl="1"/>
+            <a:r>
+              <a:rPr lang="en-US" dirty="0" smtClean="0"/>
+              <a:t>improves NN size support with near deterministic performance</a:t>
+            </a:r>
+          </a:p>
+          <a:p>
+            <a:pPr lvl="1"/>
+            <a:r>
+              <a:rPr lang="en-US" dirty="0" smtClean="0"/>
+              <a:t>not optimal for NNs that take advantage of locality</a:t>
+            </a:r>
+          </a:p>
+          <a:p>
+            <a:r>
+              <a:rPr lang="en-US" dirty="0" smtClean="0"/>
+              <a:t>Processing Layer can be customized</a:t>
+            </a:r>
+          </a:p>
+          <a:p>
+            <a:pPr lvl="1"/>
+            <a:r>
+              <a:rPr lang="en-US" dirty="0" smtClean="0"/>
+              <a:t>PE layer designed to support application specific accuracy, algorithm etc.</a:t>
+            </a:r>
+          </a:p>
+        </p:txBody>
+      </p:sp>
+      <p:sp>
+        <p:nvSpPr>
+          <p:cNvPr id="4" name="Slide Number Placeholder 3"/>
           <p:cNvSpPr>
             <a:spLocks noGrp="1"/>
           </p:cNvSpPr>
@@ -8465,6 +8167,377 @@
                 <a:defRPr/>
               </a:pPr>
               <a:t>11</a:t>
+            </a:fld>
+            <a:endParaRPr lang="en-US"/>
+          </a:p>
+        </p:txBody>
+      </p:sp>
+    </p:spTree>
+    <p:extLst>
+      <p:ext uri="{BB962C8B-B14F-4D97-AF65-F5344CB8AC3E}">
+        <p14:creationId xmlns:p14="http://schemas.microsoft.com/office/powerpoint/2010/main" val="3927375318"/>
+      </p:ext>
+    </p:extLst>
+  </p:cSld>
+  <p:clrMapOvr>
+    <a:masterClrMapping/>
+  </p:clrMapOvr>
+</p:sld>
+</file>
+
+<file path=ppt/slides/slide12.xml><?xml version="1.0" encoding="utf-8"?>
+<p:sld xmlns:a="http://schemas.openxmlformats.org/drawingml/2006/main" xmlns:r="http://schemas.openxmlformats.org/officeDocument/2006/relationships" xmlns:p="http://schemas.openxmlformats.org/presentationml/2006/main">
+  <p:cSld>
+    <p:spTree>
+      <p:nvGrpSpPr>
+        <p:cNvPr id="1" name=""/>
+        <p:cNvGrpSpPr/>
+        <p:nvPr/>
+      </p:nvGrpSpPr>
+      <p:grpSpPr>
+        <a:xfrm>
+          <a:off x="0" y="0"/>
+          <a:ext cx="0" cy="0"/>
+          <a:chOff x="0" y="0"/>
+          <a:chExt cx="0" cy="0"/>
+        </a:xfrm>
+      </p:grpSpPr>
+      <p:sp>
+        <p:nvSpPr>
+          <p:cNvPr id="3" name="Content Placeholder 2"/>
+          <p:cNvSpPr>
+            <a:spLocks noGrp="1"/>
+          </p:cNvSpPr>
+          <p:nvPr>
+            <p:ph idx="1"/>
+          </p:nvPr>
+        </p:nvSpPr>
+        <p:spPr>
+          <a:xfrm>
+            <a:off x="502920" y="1590100"/>
+            <a:ext cx="9052560" cy="5792555"/>
+          </a:xfrm>
+        </p:spPr>
+        <p:txBody>
+          <a:bodyPr>
+            <a:normAutofit fontScale="92500" lnSpcReduction="20000"/>
+          </a:bodyPr>
+          <a:lstStyle/>
+          <a:p>
+            <a:pPr fontAlgn="auto">
+              <a:spcAft>
+                <a:spcPts val="669"/>
+              </a:spcAft>
+              <a:defRPr/>
+            </a:pPr>
+            <a:r>
+              <a:rPr lang="en-US" dirty="0" smtClean="0">
+                <a:solidFill>
+                  <a:srgbClr val="000000"/>
+                </a:solidFill>
+                <a:cs typeface="Monaco"/>
+              </a:rPr>
+              <a:t>Architecture includes:</a:t>
+            </a:r>
+          </a:p>
+          <a:p>
+            <a:pPr lvl="1" fontAlgn="auto">
+              <a:spcAft>
+                <a:spcPts val="669"/>
+              </a:spcAft>
+              <a:defRPr/>
+            </a:pPr>
+            <a:r>
+              <a:rPr lang="en-US" dirty="0" smtClean="0">
+                <a:solidFill>
+                  <a:srgbClr val="000000"/>
+                </a:solidFill>
+                <a:cs typeface="Monaco"/>
+              </a:rPr>
+              <a:t>Custom </a:t>
+            </a:r>
+            <a:r>
+              <a:rPr lang="en-US" dirty="0">
+                <a:solidFill>
+                  <a:srgbClr val="000000"/>
+                </a:solidFill>
+                <a:cs typeface="Monaco"/>
+              </a:rPr>
+              <a:t>organized 3D-</a:t>
+            </a:r>
+            <a:r>
+              <a:rPr lang="en-US" dirty="0" smtClean="0">
+                <a:solidFill>
+                  <a:srgbClr val="000000"/>
+                </a:solidFill>
+                <a:cs typeface="Monaco"/>
+              </a:rPr>
+              <a:t>DRAM specification</a:t>
+            </a:r>
+          </a:p>
+          <a:p>
+            <a:pPr lvl="2" fontAlgn="auto">
+              <a:spcAft>
+                <a:spcPts val="669"/>
+              </a:spcAft>
+              <a:defRPr/>
+            </a:pPr>
+            <a:r>
+              <a:rPr lang="en-US" dirty="0" smtClean="0">
+                <a:solidFill>
+                  <a:srgbClr val="000000"/>
+                </a:solidFill>
+                <a:cs typeface="Monaco"/>
+              </a:rPr>
+              <a:t>allows constant streaming of data to PE avoiding local storage</a:t>
+            </a:r>
+          </a:p>
+          <a:p>
+            <a:pPr lvl="1" fontAlgn="auto">
+              <a:spcAft>
+                <a:spcPts val="669"/>
+              </a:spcAft>
+              <a:defRPr/>
+            </a:pPr>
+            <a:r>
+              <a:rPr lang="en-US" dirty="0" smtClean="0">
+                <a:solidFill>
+                  <a:srgbClr val="000000"/>
+                </a:solidFill>
+                <a:cs typeface="Monaco"/>
+              </a:rPr>
+              <a:t>Data Structures specific to each ANN</a:t>
+            </a:r>
+            <a:endParaRPr lang="en-US" dirty="0">
+              <a:solidFill>
+                <a:srgbClr val="000000"/>
+              </a:solidFill>
+              <a:cs typeface="Monaco"/>
+            </a:endParaRPr>
+          </a:p>
+          <a:p>
+            <a:pPr lvl="1" fontAlgn="auto">
+              <a:spcAft>
+                <a:spcPts val="669"/>
+              </a:spcAft>
+              <a:defRPr/>
+            </a:pPr>
+            <a:r>
+              <a:rPr lang="en-US" dirty="0">
+                <a:solidFill>
+                  <a:srgbClr val="000000"/>
+                </a:solidFill>
+                <a:cs typeface="Monaco"/>
+              </a:rPr>
+              <a:t>Management Layer </a:t>
+            </a:r>
+            <a:r>
+              <a:rPr lang="en-US" dirty="0" smtClean="0">
+                <a:solidFill>
+                  <a:srgbClr val="000000"/>
+                </a:solidFill>
+                <a:cs typeface="Monaco"/>
+              </a:rPr>
+              <a:t>for configuration and control</a:t>
+            </a:r>
+          </a:p>
+          <a:p>
+            <a:pPr lvl="1" fontAlgn="auto">
+              <a:spcAft>
+                <a:spcPts val="669"/>
+              </a:spcAft>
+              <a:defRPr/>
+            </a:pPr>
+            <a:r>
+              <a:rPr lang="en-US" dirty="0" smtClean="0">
+                <a:solidFill>
+                  <a:srgbClr val="000000"/>
+                </a:solidFill>
+                <a:cs typeface="Monaco"/>
+              </a:rPr>
+              <a:t>Processing layer(s) targeted toward a family of ANNs</a:t>
+            </a:r>
+          </a:p>
+          <a:p>
+            <a:pPr lvl="2" fontAlgn="auto">
+              <a:spcAft>
+                <a:spcPts val="669"/>
+              </a:spcAft>
+              <a:defRPr/>
+            </a:pPr>
+            <a:r>
+              <a:rPr lang="en-US" dirty="0" smtClean="0">
+                <a:solidFill>
+                  <a:srgbClr val="000000"/>
+                </a:solidFill>
+                <a:cs typeface="Monaco"/>
+              </a:rPr>
+              <a:t>array of processing engines (PE) with special streaming functions</a:t>
+            </a:r>
+            <a:endParaRPr lang="en-US" dirty="0">
+              <a:solidFill>
+                <a:srgbClr val="000000"/>
+              </a:solidFill>
+              <a:cs typeface="Monaco"/>
+            </a:endParaRPr>
+          </a:p>
+          <a:p>
+            <a:pPr lvl="2" fontAlgn="auto">
+              <a:spcAft>
+                <a:spcPts val="669"/>
+              </a:spcAft>
+              <a:defRPr/>
+            </a:pPr>
+            <a:r>
+              <a:rPr lang="en-US" dirty="0" smtClean="0">
+                <a:solidFill>
+                  <a:srgbClr val="000000"/>
+                </a:solidFill>
+                <a:cs typeface="Monaco"/>
+              </a:rPr>
+              <a:t>PE includes small SIMD unit to </a:t>
+            </a:r>
+            <a:r>
+              <a:rPr lang="en-US" dirty="0">
+                <a:solidFill>
+                  <a:srgbClr val="000000"/>
+                </a:solidFill>
+                <a:cs typeface="Monaco"/>
+              </a:rPr>
+              <a:t>process non hot-spot functions and provide some </a:t>
+            </a:r>
+            <a:r>
+              <a:rPr lang="en-US" dirty="0" smtClean="0">
+                <a:solidFill>
+                  <a:srgbClr val="000000"/>
+                </a:solidFill>
+                <a:cs typeface="Monaco"/>
+              </a:rPr>
+              <a:t>generality</a:t>
+            </a:r>
+          </a:p>
+          <a:p>
+            <a:pPr fontAlgn="auto">
+              <a:spcAft>
+                <a:spcPts val="669"/>
+              </a:spcAft>
+              <a:defRPr/>
+            </a:pPr>
+            <a:r>
+              <a:rPr lang="en-US" dirty="0" smtClean="0">
+                <a:solidFill>
+                  <a:srgbClr val="000000"/>
+                </a:solidFill>
+                <a:cs typeface="Monaco"/>
+              </a:rPr>
+              <a:t>3D solution contained within the footprint of available DRAM</a:t>
+            </a:r>
+          </a:p>
+          <a:p>
+            <a:pPr lvl="1" fontAlgn="auto">
+              <a:spcAft>
+                <a:spcPts val="669"/>
+              </a:spcAft>
+              <a:defRPr/>
+            </a:pPr>
+            <a:r>
+              <a:rPr lang="en-US" dirty="0" smtClean="0">
+                <a:solidFill>
+                  <a:srgbClr val="000000"/>
+                </a:solidFill>
+                <a:cs typeface="Monaco"/>
+              </a:rPr>
+              <a:t>allows use of TSV’s for memory interface</a:t>
+            </a:r>
+          </a:p>
+          <a:p>
+            <a:pPr lvl="1" fontAlgn="auto">
+              <a:spcAft>
+                <a:spcPts val="669"/>
+              </a:spcAft>
+              <a:defRPr/>
+            </a:pPr>
+            <a:r>
+              <a:rPr lang="en-US" dirty="0" smtClean="0">
+                <a:solidFill>
+                  <a:srgbClr val="000000"/>
+                </a:solidFill>
+                <a:cs typeface="Monaco"/>
+              </a:rPr>
+              <a:t>PE provides 32 execution lanes within the footprint</a:t>
+            </a:r>
+          </a:p>
+          <a:p>
+            <a:pPr lvl="1" fontAlgn="auto">
+              <a:spcAft>
+                <a:spcPts val="669"/>
+              </a:spcAft>
+              <a:defRPr/>
+            </a:pPr>
+            <a:r>
+              <a:rPr lang="en-US" dirty="0" smtClean="0">
+                <a:solidFill>
+                  <a:srgbClr val="000000"/>
+                </a:solidFill>
+                <a:cs typeface="Monaco"/>
+              </a:rPr>
+              <a:t>minimal use of local SRAM allows PE and manager logic to fit within footprint</a:t>
+            </a:r>
+          </a:p>
+        </p:txBody>
+      </p:sp>
+      <p:sp>
+        <p:nvSpPr>
+          <p:cNvPr id="2" name="Title 1"/>
+          <p:cNvSpPr>
+            <a:spLocks noGrp="1"/>
+          </p:cNvSpPr>
+          <p:nvPr>
+            <p:ph type="title"/>
+          </p:nvPr>
+        </p:nvSpPr>
+        <p:spPr>
+          <a:xfrm>
+            <a:off x="502920" y="587223"/>
+            <a:ext cx="9052560" cy="865813"/>
+          </a:xfrm>
+        </p:spPr>
+        <p:txBody>
+          <a:bodyPr/>
+          <a:lstStyle/>
+          <a:p>
+            <a:r>
+              <a:rPr lang="en-US" dirty="0" smtClean="0"/>
+              <a:t>Solution</a:t>
+            </a:r>
+            <a:endParaRPr lang="en-US" dirty="0"/>
+          </a:p>
+        </p:txBody>
+      </p:sp>
+      <p:sp>
+        <p:nvSpPr>
+          <p:cNvPr id="5" name="Slide Number Placeholder 4"/>
+          <p:cNvSpPr>
+            <a:spLocks noGrp="1"/>
+          </p:cNvSpPr>
+          <p:nvPr>
+            <p:ph type="sldNum" sz="quarter" idx="12"/>
+          </p:nvPr>
+        </p:nvSpPr>
+        <p:spPr/>
+        <p:txBody>
+          <a:bodyPr/>
+          <a:lstStyle/>
+          <a:p>
+            <a:pPr>
+              <a:defRPr/>
+            </a:pPr>
+            <a:fld id="{3FF2C605-4958-CF43-AA48-80339EFDB0AF}" type="slidenum">
+              <a:rPr lang="en-US" smtClean="0"/>
+              <a:pPr>
+                <a:defRPr/>
+              </a:pPr>
+              <a:t>12</a:t>
             </a:fld>
             <a:endParaRPr lang="en-US"/>
           </a:p>
@@ -8490,7 +8563,7 @@
 </p:sld>
 </file>
 
-<file path=ppt/slides/slide12.xml><?xml version="1.0" encoding="utf-8"?>
+<file path=ppt/slides/slide13.xml><?xml version="1.0" encoding="utf-8"?>
 <p:sld xmlns:a="http://schemas.openxmlformats.org/drawingml/2006/main" xmlns:r="http://schemas.openxmlformats.org/officeDocument/2006/relationships" xmlns:p="http://schemas.openxmlformats.org/presentationml/2006/main">
   <p:cSld>
     <p:spTree>
@@ -8558,7 +8631,7 @@
               <a:pPr>
                 <a:defRPr/>
               </a:pPr>
-              <a:t>12</a:t>
+              <a:t>13</a:t>
             </a:fld>
             <a:endParaRPr lang="en-US"/>
           </a:p>
@@ -8874,7 +8947,220 @@
 </p:sld>
 </file>
 
-<file path=ppt/slides/slide13.xml><?xml version="1.0" encoding="utf-8"?>
+<file path=ppt/slides/slide14.xml><?xml version="1.0" encoding="utf-8"?>
+<p:sld xmlns:a="http://schemas.openxmlformats.org/drawingml/2006/main" xmlns:r="http://schemas.openxmlformats.org/officeDocument/2006/relationships" xmlns:p="http://schemas.openxmlformats.org/presentationml/2006/main">
+  <p:cSld>
+    <p:spTree>
+      <p:nvGrpSpPr>
+        <p:cNvPr id="1" name=""/>
+        <p:cNvGrpSpPr/>
+        <p:nvPr/>
+      </p:nvGrpSpPr>
+      <p:grpSpPr>
+        <a:xfrm>
+          <a:off x="0" y="0"/>
+          <a:ext cx="0" cy="0"/>
+          <a:chOff x="0" y="0"/>
+          <a:chExt cx="0" cy="0"/>
+        </a:xfrm>
+      </p:grpSpPr>
+      <p:sp>
+        <p:nvSpPr>
+          <p:cNvPr id="2" name="Title 1"/>
+          <p:cNvSpPr>
+            <a:spLocks noGrp="1"/>
+          </p:cNvSpPr>
+          <p:nvPr>
+            <p:ph type="title"/>
+          </p:nvPr>
+        </p:nvSpPr>
+        <p:spPr>
+          <a:xfrm>
+            <a:off x="502920" y="603568"/>
+            <a:ext cx="9052560" cy="1210839"/>
+          </a:xfrm>
+        </p:spPr>
+        <p:txBody>
+          <a:bodyPr/>
+          <a:lstStyle/>
+          <a:p>
+            <a:r>
+              <a:rPr lang="en-US" dirty="0" smtClean="0"/>
+              <a:t>Potential Customers</a:t>
+            </a:r>
+            <a:endParaRPr lang="en-US" dirty="0"/>
+          </a:p>
+        </p:txBody>
+      </p:sp>
+      <p:sp>
+        <p:nvSpPr>
+          <p:cNvPr id="3" name="Content Placeholder 2"/>
+          <p:cNvSpPr>
+            <a:spLocks noGrp="1"/>
+          </p:cNvSpPr>
+          <p:nvPr>
+            <p:ph idx="1"/>
+          </p:nvPr>
+        </p:nvSpPr>
+        <p:spPr>
+          <a:xfrm>
+            <a:off x="502920" y="1836422"/>
+            <a:ext cx="9052560" cy="5153658"/>
+          </a:xfrm>
+        </p:spPr>
+        <p:txBody>
+          <a:bodyPr>
+            <a:normAutofit fontScale="85000" lnSpcReduction="20000"/>
+          </a:bodyPr>
+          <a:lstStyle/>
+          <a:p>
+            <a:r>
+              <a:rPr lang="en-US" dirty="0" smtClean="0"/>
+              <a:t>Google current have their own solution in the datacenter space</a:t>
+            </a:r>
+          </a:p>
+          <a:p>
+            <a:pPr lvl="1"/>
+            <a:r>
+              <a:rPr lang="en-US" dirty="0" smtClean="0"/>
+              <a:t>Tensor processing unit is a custom ASIC</a:t>
+            </a:r>
+          </a:p>
+          <a:p>
+            <a:pPr lvl="2"/>
+            <a:r>
+              <a:rPr lang="en-US" dirty="0" smtClean="0"/>
+              <a:t>large local SRAM and a large array (64K) of 8-bit MACs</a:t>
+            </a:r>
+          </a:p>
+          <a:p>
+            <a:pPr lvl="2"/>
+            <a:r>
+              <a:rPr lang="en-US" dirty="0" smtClean="0"/>
+              <a:t>lower DRAM bandwidth</a:t>
+            </a:r>
+          </a:p>
+          <a:p>
+            <a:pPr lvl="1"/>
+            <a:r>
+              <a:rPr lang="en-US" dirty="0"/>
+              <a:t>H</a:t>
+            </a:r>
+            <a:r>
+              <a:rPr lang="en-US" dirty="0" smtClean="0"/>
+              <a:t>igh percentage of their NNs are MLP and LSTM and smaller percentage (5%) are CNNs</a:t>
+            </a:r>
+          </a:p>
+          <a:p>
+            <a:pPr lvl="2"/>
+            <a:r>
+              <a:rPr lang="en-US" dirty="0" smtClean="0"/>
+              <a:t>CNNs take advantage of locality and are suited to using large local SRAM</a:t>
+            </a:r>
+          </a:p>
+          <a:p>
+            <a:pPr lvl="2"/>
+            <a:r>
+              <a:rPr lang="en-US" dirty="0" smtClean="0"/>
+              <a:t>it may be the case that as MLP </a:t>
+            </a:r>
+            <a:r>
+              <a:rPr lang="en-US" dirty="0"/>
+              <a:t>and </a:t>
+            </a:r>
+            <a:r>
+              <a:rPr lang="en-US" dirty="0" smtClean="0"/>
+              <a:t>LSTM have many fully/locally connected layers, they are impacted by a low main memory bandwidth</a:t>
+            </a:r>
+          </a:p>
+          <a:p>
+            <a:r>
+              <a:rPr lang="en-US" dirty="0" smtClean="0"/>
+              <a:t>3D DRAM System could provide performance improvement in accelerating MLPs and LSTM </a:t>
+            </a:r>
+          </a:p>
+          <a:p>
+            <a:pPr lvl="1"/>
+            <a:r>
+              <a:rPr lang="en-US" dirty="0" smtClean="0"/>
+              <a:t>provide the bandwidth to support the bulk of the NNs processed in their datacenters</a:t>
+            </a:r>
+          </a:p>
+          <a:p>
+            <a:pPr lvl="1"/>
+            <a:r>
+              <a:rPr lang="en-US" dirty="0" smtClean="0"/>
+              <a:t>a custom 3D solution could provide a PE layer to support the target resolution</a:t>
+            </a:r>
+          </a:p>
+          <a:p>
+            <a:pPr lvl="2"/>
+            <a:r>
+              <a:rPr lang="en-US" dirty="0" smtClean="0"/>
+              <a:t>perhaps work with </a:t>
+            </a:r>
+            <a:r>
+              <a:rPr lang="en-US" dirty="0" err="1" smtClean="0"/>
+              <a:t>google</a:t>
+            </a:r>
+            <a:r>
+              <a:rPr lang="en-US" dirty="0" smtClean="0"/>
+              <a:t> to integrate 8/16-bit PE similar to their TPU</a:t>
+            </a:r>
+          </a:p>
+          <a:p>
+            <a:pPr lvl="1"/>
+            <a:endParaRPr lang="en-US" dirty="0" smtClean="0"/>
+          </a:p>
+          <a:p>
+            <a:pPr lvl="1"/>
+            <a:endParaRPr lang="en-US" dirty="0"/>
+          </a:p>
+        </p:txBody>
+      </p:sp>
+      <p:sp>
+        <p:nvSpPr>
+          <p:cNvPr id="4" name="Slide Number Placeholder 3"/>
+          <p:cNvSpPr>
+            <a:spLocks noGrp="1"/>
+          </p:cNvSpPr>
+          <p:nvPr>
+            <p:ph type="sldNum" sz="quarter" idx="12"/>
+          </p:nvPr>
+        </p:nvSpPr>
+        <p:spPr/>
+        <p:txBody>
+          <a:bodyPr/>
+          <a:lstStyle/>
+          <a:p>
+            <a:pPr>
+              <a:defRPr/>
+            </a:pPr>
+            <a:fld id="{3FF2C605-4958-CF43-AA48-80339EFDB0AF}" type="slidenum">
+              <a:rPr lang="en-US" smtClean="0"/>
+              <a:pPr>
+                <a:defRPr/>
+              </a:pPr>
+              <a:t>14</a:t>
+            </a:fld>
+            <a:endParaRPr lang="en-US"/>
+          </a:p>
+        </p:txBody>
+      </p:sp>
+    </p:spTree>
+    <p:extLst>
+      <p:ext uri="{BB962C8B-B14F-4D97-AF65-F5344CB8AC3E}">
+        <p14:creationId xmlns:p14="http://schemas.microsoft.com/office/powerpoint/2010/main" val="2517572376"/>
+      </p:ext>
+    </p:extLst>
+  </p:cSld>
+  <p:clrMapOvr>
+    <a:masterClrMapping/>
+  </p:clrMapOvr>
+</p:sld>
+</file>
+
+<file path=ppt/slides/slide15.xml><?xml version="1.0" encoding="utf-8"?>
 <p:sld xmlns:a="http://schemas.openxmlformats.org/drawingml/2006/main" xmlns:r="http://schemas.openxmlformats.org/officeDocument/2006/relationships" xmlns:p="http://schemas.openxmlformats.org/presentationml/2006/main">
   <p:cSld>
     <p:spTree>
@@ -8972,7 +9258,7 @@
               <a:pPr>
                 <a:defRPr/>
               </a:pPr>
-              <a:t>13</a:t>
+              <a:t>15</a:t>
             </a:fld>
             <a:endParaRPr lang="en-US"/>
           </a:p>
@@ -9198,7 +9484,7 @@
 </p:sld>
 </file>
 
-<file path=ppt/slides/slide14.xml><?xml version="1.0" encoding="utf-8"?>
+<file path=ppt/slides/slide16.xml><?xml version="1.0" encoding="utf-8"?>
 <p:sld xmlns:a="http://schemas.openxmlformats.org/drawingml/2006/main" xmlns:r="http://schemas.openxmlformats.org/officeDocument/2006/relationships" xmlns:p="http://schemas.openxmlformats.org/presentationml/2006/main">
   <p:cSld>
     <p:spTree>
@@ -9294,7 +9580,6 @@
               <a:rPr lang="en-US" dirty="0" smtClean="0"/>
               <a:t>PE</a:t>
             </a:r>
-            <a:endParaRPr lang="en-US" dirty="0" smtClean="0"/>
           </a:p>
           <a:p>
             <a:r>
@@ -9306,11 +9591,7 @@
             <a:pPr lvl="1"/>
             <a:r>
               <a:rPr lang="en-US" dirty="0" smtClean="0"/>
-              <a:t>no assumptions on data </a:t>
-            </a:r>
-            <a:r>
-              <a:rPr lang="en-US" dirty="0" smtClean="0"/>
-              <a:t>reuse (kernels or input)</a:t>
+              <a:t>no assumptions on data reuse (kernels or input)</a:t>
             </a:r>
           </a:p>
           <a:p>
@@ -9387,7 +9668,7 @@
               <a:pPr>
                 <a:defRPr/>
               </a:pPr>
-              <a:t>14</a:t>
+              <a:t>16</a:t>
             </a:fld>
             <a:endParaRPr lang="en-US"/>
           </a:p>
@@ -9413,7 +9694,7 @@
 </p:sld>
 </file>
 
-<file path=ppt/slides/slide15.xml><?xml version="1.0" encoding="utf-8"?>
+<file path=ppt/slides/slide17.xml><?xml version="1.0" encoding="utf-8"?>
 <p:sld xmlns:a="http://schemas.openxmlformats.org/drawingml/2006/main" xmlns:r="http://schemas.openxmlformats.org/officeDocument/2006/relationships" xmlns:p="http://schemas.openxmlformats.org/presentationml/2006/main">
   <p:cSld>
     <p:spTree>
@@ -9511,7 +9792,7 @@
               <a:pPr>
                 <a:defRPr/>
               </a:pPr>
-              <a:t>15</a:t>
+              <a:t>17</a:t>
             </a:fld>
             <a:endParaRPr lang="en-US"/>
           </a:p>
@@ -9821,7 +10102,7 @@
 </p:sld>
 </file>
 
-<file path=ppt/slides/slide16.xml><?xml version="1.0" encoding="utf-8"?>
+<file path=ppt/slides/slide18.xml><?xml version="1.0" encoding="utf-8"?>
 <p:sld xmlns:a="http://schemas.openxmlformats.org/drawingml/2006/main" xmlns:r="http://schemas.openxmlformats.org/officeDocument/2006/relationships" xmlns:p="http://schemas.openxmlformats.org/presentationml/2006/main">
   <p:cSld>
     <p:spTree>
@@ -9889,7 +10170,7 @@
               <a:pPr>
                 <a:defRPr/>
               </a:pPr>
-              <a:t>16</a:t>
+              <a:t>18</a:t>
             </a:fld>
             <a:endParaRPr lang="en-US"/>
           </a:p>
@@ -10115,23 +10396,14 @@
           <a:p>
             <a:r>
               <a:rPr lang="en-US" dirty="0" smtClean="0"/>
-              <a:t>Instruction must describe operations for processing a group of </a:t>
-            </a:r>
-            <a:r>
-              <a:rPr lang="en-US" dirty="0" smtClean="0"/>
-              <a:t>neurons</a:t>
-            </a:r>
-            <a:endParaRPr lang="en-US" dirty="0" smtClean="0"/>
+              <a:t>Instruction must describe operations for processing a group of neurons</a:t>
+            </a:r>
           </a:p>
           <a:p>
             <a:pPr lvl="1"/>
             <a:r>
               <a:rPr lang="en-US" dirty="0" smtClean="0"/>
-              <a:t>convolution of </a:t>
-            </a:r>
-            <a:r>
-              <a:rPr lang="en-US" dirty="0" smtClean="0"/>
-              <a:t>weights and input</a:t>
+              <a:t>convolution of weights and input</a:t>
             </a:r>
           </a:p>
           <a:p>
@@ -10156,23 +10428,14 @@
             <a:pPr lvl="1"/>
             <a:r>
               <a:rPr lang="en-US" dirty="0" smtClean="0"/>
-              <a:t>where and how to read </a:t>
-            </a:r>
-            <a:r>
-              <a:rPr lang="en-US" dirty="0" smtClean="0"/>
-              <a:t>prior activations</a:t>
-            </a:r>
-            <a:endParaRPr lang="en-US" dirty="0" smtClean="0"/>
+              <a:t>where and how to read prior activations</a:t>
+            </a:r>
           </a:p>
           <a:p>
             <a:pPr lvl="1"/>
             <a:r>
               <a:rPr lang="en-US" dirty="0" smtClean="0"/>
-              <a:t>where and how to save neuron </a:t>
-            </a:r>
-            <a:r>
-              <a:rPr lang="en-US" dirty="0" smtClean="0"/>
-              <a:t>activations</a:t>
+              <a:t>where and how to save neuron activations</a:t>
             </a:r>
           </a:p>
           <a:p>
@@ -10208,18 +10471,12 @@
               <a:rPr lang="en-US" dirty="0" smtClean="0"/>
               <a:t>Write-Back operation</a:t>
             </a:r>
-            <a:endParaRPr lang="en-US" dirty="0" smtClean="0"/>
-          </a:p>
-          <a:p>
-            <a:r>
-              <a:rPr lang="en-US" dirty="0" smtClean="0"/>
-              <a:t>Instruction decoder generates control messages </a:t>
-            </a:r>
-            <a:r>
-              <a:rPr lang="en-US" dirty="0" smtClean="0"/>
-              <a:t>from descriptors:</a:t>
-            </a:r>
-            <a:endParaRPr lang="en-US" dirty="0" smtClean="0"/>
+          </a:p>
+          <a:p>
+            <a:r>
+              <a:rPr lang="en-US" dirty="0" smtClean="0"/>
+              <a:t>Instruction decoder generates control messages from descriptors:</a:t>
+            </a:r>
           </a:p>
           <a:p>
             <a:pPr lvl="1">
@@ -10274,7 +10531,7 @@
 </p:sld>
 </file>
 
-<file path=ppt/slides/slide17.xml><?xml version="1.0" encoding="utf-8"?>
+<file path=ppt/slides/slide19.xml><?xml version="1.0" encoding="utf-8"?>
 <p:sld xmlns:a="http://schemas.openxmlformats.org/drawingml/2006/main" xmlns:r="http://schemas.openxmlformats.org/officeDocument/2006/relationships" xmlns:p="http://schemas.openxmlformats.org/presentationml/2006/main">
   <p:cSld>
     <p:spTree>
@@ -10342,7 +10599,7 @@
               <a:pPr>
                 <a:defRPr/>
               </a:pPr>
-              <a:t>17</a:t>
+              <a:t>19</a:t>
             </a:fld>
             <a:endParaRPr lang="en-US"/>
           </a:p>
@@ -10629,730 +10886,6 @@
   <p:clrMapOvr>
     <a:masterClrMapping/>
   </p:clrMapOvr>
-</p:sld>
-</file>
-
-<file path=ppt/slides/slide18.xml><?xml version="1.0" encoding="utf-8"?>
-<p:sld xmlns:a="http://schemas.openxmlformats.org/drawingml/2006/main" xmlns:r="http://schemas.openxmlformats.org/officeDocument/2006/relationships" xmlns:p="http://schemas.openxmlformats.org/presentationml/2006/main">
-  <p:cSld>
-    <p:spTree>
-      <p:nvGrpSpPr>
-        <p:cNvPr id="1" name=""/>
-        <p:cNvGrpSpPr/>
-        <p:nvPr/>
-      </p:nvGrpSpPr>
-      <p:grpSpPr>
-        <a:xfrm>
-          <a:off x="0" y="0"/>
-          <a:ext cx="0" cy="0"/>
-          <a:chOff x="0" y="0"/>
-          <a:chExt cx="0" cy="0"/>
-        </a:xfrm>
-      </p:grpSpPr>
-      <p:sp>
-        <p:nvSpPr>
-          <p:cNvPr id="4" name="Slide Number Placeholder 3"/>
-          <p:cNvSpPr>
-            <a:spLocks noGrp="1"/>
-          </p:cNvSpPr>
-          <p:nvPr>
-            <p:ph type="sldNum" sz="quarter" idx="12"/>
-          </p:nvPr>
-        </p:nvSpPr>
-        <p:spPr/>
-        <p:txBody>
-          <a:bodyPr/>
-          <a:lstStyle/>
-          <a:p>
-            <a:pPr>
-              <a:defRPr/>
-            </a:pPr>
-            <a:fld id="{3FF2C605-4958-CF43-AA48-80339EFDB0AF}" type="slidenum">
-              <a:rPr lang="en-US" smtClean="0"/>
-              <a:pPr>
-                <a:defRPr/>
-              </a:pPr>
-              <a:t>18</a:t>
-            </a:fld>
-            <a:endParaRPr lang="en-US"/>
-          </a:p>
-        </p:txBody>
-      </p:sp>
-      <p:sp>
-        <p:nvSpPr>
-          <p:cNvPr id="5" name="Title 1"/>
-          <p:cNvSpPr txBox="1">
-            <a:spLocks/>
-          </p:cNvSpPr>
-          <p:nvPr/>
-        </p:nvSpPr>
-        <p:spPr bwMode="auto">
-          <a:xfrm>
-            <a:off x="502920" y="619551"/>
-            <a:ext cx="9052560" cy="1210839"/>
-          </a:xfrm>
-          <a:prstGeom prst="rect">
-            <a:avLst/>
-          </a:prstGeom>
-          <a:noFill/>
-          <a:ln>
-            <a:noFill/>
-          </a:ln>
-          <a:extLst>
-            <a:ext uri="{909E8E84-426E-40dd-AFC4-6F175D3DCCD1}">
-              <a14:hiddenFill xmlns:a14="http://schemas.microsoft.com/office/drawing/2010/main">
-                <a:solidFill>
-                  <a:srgbClr val="FFFFFF"/>
-                </a:solidFill>
-              </a14:hiddenFill>
-            </a:ext>
-            <a:ext uri="{91240B29-F687-4f45-9708-019B960494DF}">
-              <a14:hiddenLine xmlns:a14="http://schemas.microsoft.com/office/drawing/2010/main" w="9525">
-                <a:solidFill>
-                  <a:srgbClr val="000000"/>
-                </a:solidFill>
-                <a:miter lim="800000"/>
-                <a:headEnd/>
-                <a:tailEnd/>
-              </a14:hiddenLine>
-            </a:ext>
-            <a:ext uri="{FAA26D3D-D897-4be2-8F04-BA451C77F1D7}">
-              <ma14:placeholderFlag xmlns:ma14="http://schemas.microsoft.com/office/mac/drawingml/2011/main" val="1"/>
-            </a:ext>
-          </a:extLst>
-        </p:spPr>
-        <p:txBody>
-          <a:bodyPr vert="horz" wrap="square" lIns="101882" tIns="50941" rIns="101882" bIns="50941" numCol="1" anchor="ctr" anchorCtr="0" compatLnSpc="1">
-            <a:prstTxWarp prst="textNoShape">
-              <a:avLst/>
-            </a:prstTxWarp>
-          </a:bodyPr>
-          <a:lstStyle>
-            <a:lvl1pPr algn="ctr" defTabSz="509412" rtl="0" eaLnBrk="1" fontAlgn="base" hangingPunct="1">
-              <a:spcBef>
-                <a:spcPct val="0"/>
-              </a:spcBef>
-              <a:spcAft>
-                <a:spcPct val="0"/>
-              </a:spcAft>
-              <a:defRPr sz="3600" b="1" kern="1200">
-                <a:solidFill>
-                  <a:schemeClr val="tx1"/>
-                </a:solidFill>
-                <a:latin typeface="Arial"/>
-                <a:ea typeface="ＭＳ Ｐゴシック" charset="0"/>
-                <a:cs typeface="Arial"/>
-              </a:defRPr>
-            </a:lvl1pPr>
-            <a:lvl2pPr algn="ctr" defTabSz="509412" rtl="0" eaLnBrk="1" fontAlgn="base" hangingPunct="1">
-              <a:spcBef>
-                <a:spcPct val="0"/>
-              </a:spcBef>
-              <a:spcAft>
-                <a:spcPct val="0"/>
-              </a:spcAft>
-              <a:defRPr sz="3600" b="1">
-                <a:solidFill>
-                  <a:schemeClr val="tx1"/>
-                </a:solidFill>
-                <a:latin typeface="Arial" charset="0"/>
-                <a:ea typeface="ＭＳ Ｐゴシック" charset="0"/>
-              </a:defRPr>
-            </a:lvl2pPr>
-            <a:lvl3pPr algn="ctr" defTabSz="509412" rtl="0" eaLnBrk="1" fontAlgn="base" hangingPunct="1">
-              <a:spcBef>
-                <a:spcPct val="0"/>
-              </a:spcBef>
-              <a:spcAft>
-                <a:spcPct val="0"/>
-              </a:spcAft>
-              <a:defRPr sz="3600" b="1">
-                <a:solidFill>
-                  <a:schemeClr val="tx1"/>
-                </a:solidFill>
-                <a:latin typeface="Arial" charset="0"/>
-                <a:ea typeface="ＭＳ Ｐゴシック" charset="0"/>
-              </a:defRPr>
-            </a:lvl3pPr>
-            <a:lvl4pPr algn="ctr" defTabSz="509412" rtl="0" eaLnBrk="1" fontAlgn="base" hangingPunct="1">
-              <a:spcBef>
-                <a:spcPct val="0"/>
-              </a:spcBef>
-              <a:spcAft>
-                <a:spcPct val="0"/>
-              </a:spcAft>
-              <a:defRPr sz="3600" b="1">
-                <a:solidFill>
-                  <a:schemeClr val="tx1"/>
-                </a:solidFill>
-                <a:latin typeface="Arial" charset="0"/>
-                <a:ea typeface="ＭＳ Ｐゴシック" charset="0"/>
-              </a:defRPr>
-            </a:lvl4pPr>
-            <a:lvl5pPr algn="ctr" defTabSz="509412" rtl="0" eaLnBrk="1" fontAlgn="base" hangingPunct="1">
-              <a:spcBef>
-                <a:spcPct val="0"/>
-              </a:spcBef>
-              <a:spcAft>
-                <a:spcPct val="0"/>
-              </a:spcAft>
-              <a:defRPr sz="3600" b="1">
-                <a:solidFill>
-                  <a:schemeClr val="tx1"/>
-                </a:solidFill>
-                <a:latin typeface="Arial" charset="0"/>
-                <a:ea typeface="ＭＳ Ｐゴシック" charset="0"/>
-              </a:defRPr>
-            </a:lvl5pPr>
-            <a:lvl6pPr marL="509412" algn="ctr" defTabSz="509412" rtl="0" eaLnBrk="1" fontAlgn="base" hangingPunct="1">
-              <a:spcBef>
-                <a:spcPct val="0"/>
-              </a:spcBef>
-              <a:spcAft>
-                <a:spcPct val="0"/>
-              </a:spcAft>
-              <a:defRPr sz="3600" b="1">
-                <a:solidFill>
-                  <a:schemeClr val="tx1"/>
-                </a:solidFill>
-                <a:latin typeface="Arial" charset="0"/>
-                <a:ea typeface="ＭＳ Ｐゴシック" charset="0"/>
-              </a:defRPr>
-            </a:lvl6pPr>
-            <a:lvl7pPr marL="1018824" algn="ctr" defTabSz="509412" rtl="0" eaLnBrk="1" fontAlgn="base" hangingPunct="1">
-              <a:spcBef>
-                <a:spcPct val="0"/>
-              </a:spcBef>
-              <a:spcAft>
-                <a:spcPct val="0"/>
-              </a:spcAft>
-              <a:defRPr sz="3600" b="1">
-                <a:solidFill>
-                  <a:schemeClr val="tx1"/>
-                </a:solidFill>
-                <a:latin typeface="Arial" charset="0"/>
-                <a:ea typeface="ＭＳ Ｐゴシック" charset="0"/>
-              </a:defRPr>
-            </a:lvl7pPr>
-            <a:lvl8pPr marL="1528237" algn="ctr" defTabSz="509412" rtl="0" eaLnBrk="1" fontAlgn="base" hangingPunct="1">
-              <a:spcBef>
-                <a:spcPct val="0"/>
-              </a:spcBef>
-              <a:spcAft>
-                <a:spcPct val="0"/>
-              </a:spcAft>
-              <a:defRPr sz="3600" b="1">
-                <a:solidFill>
-                  <a:schemeClr val="tx1"/>
-                </a:solidFill>
-                <a:latin typeface="Arial" charset="0"/>
-                <a:ea typeface="ＭＳ Ｐゴシック" charset="0"/>
-              </a:defRPr>
-            </a:lvl8pPr>
-            <a:lvl9pPr marL="2037649" algn="ctr" defTabSz="509412" rtl="0" eaLnBrk="1" fontAlgn="base" hangingPunct="1">
-              <a:spcBef>
-                <a:spcPct val="0"/>
-              </a:spcBef>
-              <a:spcAft>
-                <a:spcPct val="0"/>
-              </a:spcAft>
-              <a:defRPr sz="3600" b="1">
-                <a:solidFill>
-                  <a:schemeClr val="tx1"/>
-                </a:solidFill>
-                <a:latin typeface="Arial" charset="0"/>
-                <a:ea typeface="ＭＳ Ｐゴシック" charset="0"/>
-              </a:defRPr>
-            </a:lvl9pPr>
-          </a:lstStyle>
-          <a:p>
-            <a:r>
-              <a:rPr lang="en-US" dirty="0" smtClean="0"/>
-              <a:t>Instruction Format</a:t>
-            </a:r>
-            <a:endParaRPr lang="en-US" dirty="0"/>
-          </a:p>
-        </p:txBody>
-      </p:sp>
-      <p:sp>
-        <p:nvSpPr>
-          <p:cNvPr id="6" name="Content Placeholder 2"/>
-          <p:cNvSpPr txBox="1">
-            <a:spLocks/>
-          </p:cNvSpPr>
-          <p:nvPr/>
-        </p:nvSpPr>
-        <p:spPr bwMode="auto">
-          <a:xfrm>
-            <a:off x="502920" y="1805942"/>
-            <a:ext cx="9052560" cy="4838698"/>
-          </a:xfrm>
-          <a:prstGeom prst="rect">
-            <a:avLst/>
-          </a:prstGeom>
-          <a:noFill/>
-          <a:ln>
-            <a:noFill/>
-          </a:ln>
-          <a:extLst>
-            <a:ext uri="{909E8E84-426E-40dd-AFC4-6F175D3DCCD1}">
-              <a14:hiddenFill xmlns:a14="http://schemas.microsoft.com/office/drawing/2010/main">
-                <a:solidFill>
-                  <a:srgbClr val="FFFFFF"/>
-                </a:solidFill>
-              </a14:hiddenFill>
-            </a:ext>
-            <a:ext uri="{91240B29-F687-4f45-9708-019B960494DF}">
-              <a14:hiddenLine xmlns:a14="http://schemas.microsoft.com/office/drawing/2010/main" w="9525">
-                <a:solidFill>
-                  <a:srgbClr val="000000"/>
-                </a:solidFill>
-                <a:miter lim="800000"/>
-                <a:headEnd/>
-                <a:tailEnd/>
-              </a14:hiddenLine>
-            </a:ext>
-            <a:ext uri="{FAA26D3D-D897-4be2-8F04-BA451C77F1D7}">
-              <ma14:placeholderFlag xmlns:ma14="http://schemas.microsoft.com/office/mac/drawingml/2011/main" val="1"/>
-            </a:ext>
-          </a:extLst>
-        </p:spPr>
-        <p:txBody>
-          <a:bodyPr vert="horz" wrap="square" lIns="101882" tIns="50941" rIns="101882" bIns="50941" numCol="1" anchor="t" anchorCtr="0" compatLnSpc="1">
-            <a:prstTxWarp prst="textNoShape">
-              <a:avLst/>
-            </a:prstTxWarp>
-            <a:normAutofit fontScale="55000" lnSpcReduction="20000"/>
-          </a:bodyPr>
-          <a:lstStyle>
-            <a:lvl1pPr marL="382059" indent="-382059" algn="l" defTabSz="509412" rtl="0" eaLnBrk="1" fontAlgn="base" hangingPunct="1">
-              <a:lnSpc>
-                <a:spcPct val="100000"/>
-              </a:lnSpc>
-              <a:spcBef>
-                <a:spcPct val="20000"/>
-              </a:spcBef>
-              <a:spcAft>
-                <a:spcPts val="300"/>
-              </a:spcAft>
-              <a:buFont typeface="Arial" charset="0"/>
-              <a:buChar char="•"/>
-              <a:defRPr sz="2800" kern="1200">
-                <a:solidFill>
-                  <a:schemeClr val="tx1"/>
-                </a:solidFill>
-                <a:latin typeface="Arial"/>
-                <a:ea typeface="ＭＳ Ｐゴシック" charset="0"/>
-                <a:cs typeface="Arial"/>
-              </a:defRPr>
-            </a:lvl1pPr>
-            <a:lvl2pPr marL="827795" indent="-318383" algn="l" defTabSz="509412" rtl="0" eaLnBrk="1" fontAlgn="base" hangingPunct="1">
-              <a:lnSpc>
-                <a:spcPct val="100000"/>
-              </a:lnSpc>
-              <a:spcBef>
-                <a:spcPct val="20000"/>
-              </a:spcBef>
-              <a:spcAft>
-                <a:spcPts val="300"/>
-              </a:spcAft>
-              <a:buFont typeface="Arial" charset="0"/>
-              <a:buChar char="–"/>
-              <a:defRPr sz="2400" kern="1200">
-                <a:solidFill>
-                  <a:schemeClr val="tx1"/>
-                </a:solidFill>
-                <a:latin typeface="Arial"/>
-                <a:ea typeface="ＭＳ Ｐゴシック" charset="0"/>
-                <a:cs typeface="Arial"/>
-              </a:defRPr>
-            </a:lvl2pPr>
-            <a:lvl3pPr marL="1273531" indent="-254706" algn="l" defTabSz="509412" rtl="0" eaLnBrk="1" fontAlgn="base" hangingPunct="1">
-              <a:lnSpc>
-                <a:spcPct val="100000"/>
-              </a:lnSpc>
-              <a:spcBef>
-                <a:spcPct val="20000"/>
-              </a:spcBef>
-              <a:spcAft>
-                <a:spcPts val="300"/>
-              </a:spcAft>
-              <a:buFont typeface="Arial" charset="0"/>
-              <a:buChar char="•"/>
-              <a:defRPr sz="2000" kern="1200">
-                <a:solidFill>
-                  <a:schemeClr val="tx1"/>
-                </a:solidFill>
-                <a:latin typeface="Arial"/>
-                <a:ea typeface="ＭＳ Ｐゴシック" charset="0"/>
-                <a:cs typeface="Arial"/>
-              </a:defRPr>
-            </a:lvl3pPr>
-            <a:lvl4pPr marL="1782943" indent="-254706" algn="l" defTabSz="509412" rtl="0" eaLnBrk="1" fontAlgn="base" hangingPunct="1">
-              <a:lnSpc>
-                <a:spcPct val="100000"/>
-              </a:lnSpc>
-              <a:spcBef>
-                <a:spcPct val="20000"/>
-              </a:spcBef>
-              <a:spcAft>
-                <a:spcPts val="300"/>
-              </a:spcAft>
-              <a:buFont typeface="Arial" charset="0"/>
-              <a:buChar char="–"/>
-              <a:defRPr sz="1800" kern="1200">
-                <a:solidFill>
-                  <a:schemeClr val="tx1"/>
-                </a:solidFill>
-                <a:latin typeface="Arial"/>
-                <a:ea typeface="ＭＳ Ｐゴシック" charset="0"/>
-                <a:cs typeface="Arial"/>
-              </a:defRPr>
-            </a:lvl4pPr>
-            <a:lvl5pPr marL="2292355" indent="-254706" algn="l" defTabSz="509412" rtl="0" eaLnBrk="1" fontAlgn="base" hangingPunct="1">
-              <a:lnSpc>
-                <a:spcPct val="100000"/>
-              </a:lnSpc>
-              <a:spcBef>
-                <a:spcPct val="20000"/>
-              </a:spcBef>
-              <a:spcAft>
-                <a:spcPts val="300"/>
-              </a:spcAft>
-              <a:buFont typeface="Arial" charset="0"/>
-              <a:buChar char="»"/>
-              <a:defRPr sz="1800" kern="1200">
-                <a:solidFill>
-                  <a:schemeClr val="tx1"/>
-                </a:solidFill>
-                <a:latin typeface="Arial"/>
-                <a:ea typeface="ＭＳ Ｐゴシック" charset="0"/>
-                <a:cs typeface="Arial"/>
-              </a:defRPr>
-            </a:lvl5pPr>
-            <a:lvl6pPr marL="2801767" indent="-254706" algn="l" defTabSz="509412" rtl="0" eaLnBrk="1" latinLnBrk="0" hangingPunct="1">
-              <a:spcBef>
-                <a:spcPct val="20000"/>
-              </a:spcBef>
-              <a:buFont typeface="Arial"/>
-              <a:buChar char="•"/>
-              <a:defRPr sz="2200" kern="1200">
-                <a:solidFill>
-                  <a:schemeClr val="tx1"/>
-                </a:solidFill>
-                <a:latin typeface="+mn-lt"/>
-                <a:ea typeface="+mn-ea"/>
-                <a:cs typeface="+mn-cs"/>
-              </a:defRPr>
-            </a:lvl6pPr>
-            <a:lvl7pPr marL="3311180" indent="-254706" algn="l" defTabSz="509412" rtl="0" eaLnBrk="1" latinLnBrk="0" hangingPunct="1">
-              <a:spcBef>
-                <a:spcPct val="20000"/>
-              </a:spcBef>
-              <a:buFont typeface="Arial"/>
-              <a:buChar char="•"/>
-              <a:defRPr sz="2200" kern="1200">
-                <a:solidFill>
-                  <a:schemeClr val="tx1"/>
-                </a:solidFill>
-                <a:latin typeface="+mn-lt"/>
-                <a:ea typeface="+mn-ea"/>
-                <a:cs typeface="+mn-cs"/>
-              </a:defRPr>
-            </a:lvl7pPr>
-            <a:lvl8pPr marL="3820592" indent="-254706" algn="l" defTabSz="509412" rtl="0" eaLnBrk="1" latinLnBrk="0" hangingPunct="1">
-              <a:spcBef>
-                <a:spcPct val="20000"/>
-              </a:spcBef>
-              <a:buFont typeface="Arial"/>
-              <a:buChar char="•"/>
-              <a:defRPr sz="2200" kern="1200">
-                <a:solidFill>
-                  <a:schemeClr val="tx1"/>
-                </a:solidFill>
-                <a:latin typeface="+mn-lt"/>
-                <a:ea typeface="+mn-ea"/>
-                <a:cs typeface="+mn-cs"/>
-              </a:defRPr>
-            </a:lvl8pPr>
-            <a:lvl9pPr marL="4330004" indent="-254706" algn="l" defTabSz="509412" rtl="0" eaLnBrk="1" latinLnBrk="0" hangingPunct="1">
-              <a:spcBef>
-                <a:spcPct val="20000"/>
-              </a:spcBef>
-              <a:buFont typeface="Arial"/>
-              <a:buChar char="•"/>
-              <a:defRPr sz="2200" kern="1200">
-                <a:solidFill>
-                  <a:schemeClr val="tx1"/>
-                </a:solidFill>
-                <a:latin typeface="+mn-lt"/>
-                <a:ea typeface="+mn-ea"/>
-                <a:cs typeface="+mn-cs"/>
-              </a:defRPr>
-            </a:lvl9pPr>
-          </a:lstStyle>
-          <a:p>
-            <a:r>
-              <a:rPr lang="en-US" dirty="0" smtClean="0"/>
-              <a:t>Instructions formed from a set of descriptors</a:t>
-            </a:r>
-          </a:p>
-          <a:p>
-            <a:r>
-              <a:rPr lang="en-US" dirty="0" smtClean="0"/>
-              <a:t>Descriptors for:</a:t>
-            </a:r>
-          </a:p>
-          <a:p>
-            <a:pPr lvl="1"/>
-            <a:r>
-              <a:rPr lang="en-US" dirty="0" smtClean="0"/>
-              <a:t>Operations</a:t>
-            </a:r>
-          </a:p>
-          <a:p>
-            <a:pPr lvl="1"/>
-            <a:r>
-              <a:rPr lang="en-US" dirty="0" smtClean="0"/>
-              <a:t>memory Read</a:t>
-            </a:r>
-          </a:p>
-          <a:p>
-            <a:pPr lvl="1"/>
-            <a:r>
-              <a:rPr lang="en-US" dirty="0" smtClean="0"/>
-              <a:t>memory Write</a:t>
-            </a:r>
-          </a:p>
-          <a:p>
-            <a:pPr lvl="1"/>
-            <a:r>
-              <a:rPr lang="en-US" dirty="0" smtClean="0"/>
-              <a:t>access method</a:t>
-            </a:r>
-          </a:p>
-          <a:p>
-            <a:r>
-              <a:rPr lang="en-US" dirty="0" smtClean="0"/>
-              <a:t>Operation descriptor</a:t>
-            </a:r>
-          </a:p>
-          <a:p>
-            <a:pPr lvl="1"/>
-            <a:r>
-              <a:rPr lang="en-US" dirty="0" smtClean="0"/>
-              <a:t>defines SIMD and </a:t>
-            </a:r>
-            <a:r>
-              <a:rPr lang="en-US" dirty="0" err="1" smtClean="0"/>
-              <a:t>stOp</a:t>
-            </a:r>
-            <a:r>
-              <a:rPr lang="en-US" dirty="0" smtClean="0"/>
-              <a:t> operations</a:t>
-            </a:r>
-          </a:p>
-          <a:p>
-            <a:pPr lvl="1"/>
-            <a:r>
-              <a:rPr lang="en-US" dirty="0" smtClean="0"/>
-              <a:t>SIMD and </a:t>
-            </a:r>
-            <a:r>
-              <a:rPr lang="en-US" dirty="0" err="1" smtClean="0"/>
-              <a:t>StOp</a:t>
-            </a:r>
-            <a:r>
-              <a:rPr lang="en-US" dirty="0" smtClean="0"/>
-              <a:t> operation stored in PE instruction memory</a:t>
-            </a:r>
-          </a:p>
-          <a:p>
-            <a:pPr lvl="1"/>
-            <a:r>
-              <a:rPr lang="en-US" dirty="0" smtClean="0"/>
-              <a:t>descriptors point to instructions in PE IM</a:t>
-            </a:r>
-          </a:p>
-          <a:p>
-            <a:r>
-              <a:rPr lang="en-US" dirty="0"/>
-              <a:t>M</a:t>
-            </a:r>
-            <a:r>
-              <a:rPr lang="en-US" dirty="0" smtClean="0"/>
-              <a:t>emory read and write Descriptor</a:t>
-            </a:r>
-          </a:p>
-          <a:p>
-            <a:pPr lvl="1"/>
-            <a:r>
-              <a:rPr lang="en-US" dirty="0" smtClean="0"/>
-              <a:t>sets start address</a:t>
-            </a:r>
-          </a:p>
-          <a:p>
-            <a:pPr lvl="1"/>
-            <a:r>
-              <a:rPr lang="en-US" dirty="0" smtClean="0"/>
-              <a:t>describes how address is accessed</a:t>
-            </a:r>
-          </a:p>
-          <a:p>
-            <a:pPr lvl="2"/>
-            <a:r>
-              <a:rPr lang="en-US" dirty="0" smtClean="0"/>
-              <a:t>bank/page/word increment order</a:t>
-            </a:r>
-          </a:p>
-          <a:p>
-            <a:pPr lvl="2"/>
-            <a:r>
-              <a:rPr lang="en-US" dirty="0" smtClean="0"/>
-              <a:t>how data is transferred to stack bus and on to PE</a:t>
-            </a:r>
-          </a:p>
-          <a:p>
-            <a:pPr lvl="1"/>
-            <a:r>
-              <a:rPr lang="en-US" dirty="0" smtClean="0"/>
-              <a:t>memory descriptor points to an access descriptor that is stored in manager memory</a:t>
-            </a:r>
-          </a:p>
-          <a:p>
-            <a:pPr lvl="1"/>
-            <a:r>
-              <a:rPr lang="en-US" dirty="0" smtClean="0"/>
-              <a:t>expect commonality amongst access methods so many descriptors may point to same access descriptor</a:t>
-            </a:r>
-          </a:p>
-          <a:p>
-            <a:r>
-              <a:rPr lang="en-US" dirty="0" smtClean="0"/>
-              <a:t>Access descriptor</a:t>
-            </a:r>
-          </a:p>
-          <a:p>
-            <a:pPr lvl="1"/>
-            <a:r>
-              <a:rPr lang="en-US" dirty="0" smtClean="0"/>
-              <a:t>not used in the actual instruction</a:t>
-            </a:r>
-          </a:p>
-          <a:p>
-            <a:pPr lvl="1"/>
-            <a:r>
-              <a:rPr lang="en-US" dirty="0" smtClean="0"/>
-              <a:t>expect some commonality between memory read and writes so avoid replicating access descriptor</a:t>
-            </a:r>
-          </a:p>
-        </p:txBody>
-      </p:sp>
-    </p:spTree>
-    <p:extLst>
-      <p:ext uri="{BB962C8B-B14F-4D97-AF65-F5344CB8AC3E}">
-        <p14:creationId xmlns:p14="http://schemas.microsoft.com/office/powerpoint/2010/main" val="2310106255"/>
-      </p:ext>
-    </p:extLst>
-  </p:cSld>
-  <p:clrMapOvr>
-    <a:masterClrMapping/>
-  </p:clrMapOvr>
-</p:sld>
-</file>
-
-<file path=ppt/slides/slide19.xml><?xml version="1.0" encoding="utf-8"?>
-<p:sld xmlns:a="http://schemas.openxmlformats.org/drawingml/2006/main" xmlns:r="http://schemas.openxmlformats.org/officeDocument/2006/relationships" xmlns:p="http://schemas.openxmlformats.org/presentationml/2006/main">
-  <p:cSld>
-    <p:spTree>
-      <p:nvGrpSpPr>
-        <p:cNvPr id="1" name=""/>
-        <p:cNvGrpSpPr/>
-        <p:nvPr/>
-      </p:nvGrpSpPr>
-      <p:grpSpPr>
-        <a:xfrm>
-          <a:off x="0" y="0"/>
-          <a:ext cx="0" cy="0"/>
-          <a:chOff x="0" y="0"/>
-          <a:chExt cx="0" cy="0"/>
-        </a:xfrm>
-      </p:grpSpPr>
-      <p:sp>
-        <p:nvSpPr>
-          <p:cNvPr id="2" name="Title 1"/>
-          <p:cNvSpPr>
-            <a:spLocks noGrp="1"/>
-          </p:cNvSpPr>
-          <p:nvPr>
-            <p:ph type="title"/>
-          </p:nvPr>
-        </p:nvSpPr>
-        <p:spPr>
-          <a:xfrm>
-            <a:off x="502920" y="1020130"/>
-            <a:ext cx="5998564" cy="2690303"/>
-          </a:xfrm>
-        </p:spPr>
-        <p:txBody>
-          <a:bodyPr/>
-          <a:lstStyle/>
-          <a:p>
-            <a:pPr algn="l"/>
-            <a:r>
-              <a:rPr lang="en-US" dirty="0" smtClean="0"/>
-              <a:t>3D Stack Bus</a:t>
-            </a:r>
-            <a:endParaRPr lang="en-US" dirty="0"/>
-          </a:p>
-        </p:txBody>
-      </p:sp>
-      <p:sp>
-        <p:nvSpPr>
-          <p:cNvPr id="4" name="Slide Number Placeholder 3"/>
-          <p:cNvSpPr>
-            <a:spLocks noGrp="1"/>
-          </p:cNvSpPr>
-          <p:nvPr>
-            <p:ph type="sldNum" sz="quarter" idx="12"/>
-          </p:nvPr>
-        </p:nvSpPr>
-        <p:spPr/>
-        <p:txBody>
-          <a:bodyPr/>
-          <a:lstStyle/>
-          <a:p>
-            <a:pPr>
-              <a:defRPr/>
-            </a:pPr>
-            <a:fld id="{3FF2C605-4958-CF43-AA48-80339EFDB0AF}" type="slidenum">
-              <a:rPr lang="en-US" smtClean="0"/>
-              <a:pPr>
-                <a:defRPr/>
-              </a:pPr>
-              <a:t>19</a:t>
-            </a:fld>
-            <a:endParaRPr lang="en-US"/>
-          </a:p>
-        </p:txBody>
-      </p:sp>
-    </p:spTree>
-    <p:extLst>
-      <p:ext uri="{BB962C8B-B14F-4D97-AF65-F5344CB8AC3E}">
-        <p14:creationId xmlns:p14="http://schemas.microsoft.com/office/powerpoint/2010/main" val="2180409873"/>
-      </p:ext>
-    </p:extLst>
-  </p:cSld>
-  <p:clrMapOvr>
-    <a:masterClrMapping/>
-  </p:clrMapOvr>
-  <p:timing>
-    <p:tnLst>
-      <p:par>
-        <p:cTn xmlns:p14="http://schemas.microsoft.com/office/powerpoint/2010/main" id="1" dur="indefinite" restart="never" nodeType="tmRoot"/>
-      </p:par>
-    </p:tnLst>
-  </p:timing>
 </p:sld>
 </file>
 
@@ -12281,111 +11814,6 @@
       </p:grpSpPr>
       <p:sp>
         <p:nvSpPr>
-          <p:cNvPr id="2" name="Title 1"/>
-          <p:cNvSpPr>
-            <a:spLocks noGrp="1"/>
-          </p:cNvSpPr>
-          <p:nvPr>
-            <p:ph type="title"/>
-          </p:nvPr>
-        </p:nvSpPr>
-        <p:spPr>
-          <a:xfrm>
-            <a:off x="502920" y="603543"/>
-            <a:ext cx="9052560" cy="1210839"/>
-          </a:xfrm>
-        </p:spPr>
-        <p:txBody>
-          <a:bodyPr/>
-          <a:lstStyle/>
-          <a:p>
-            <a:r>
-              <a:rPr lang="en-US" dirty="0" smtClean="0"/>
-              <a:t>Stack Bus</a:t>
-            </a:r>
-            <a:endParaRPr lang="en-US" dirty="0"/>
-          </a:p>
-        </p:txBody>
-      </p:sp>
-      <p:sp>
-        <p:nvSpPr>
-          <p:cNvPr id="3" name="Content Placeholder 2"/>
-          <p:cNvSpPr>
-            <a:spLocks noGrp="1"/>
-          </p:cNvSpPr>
-          <p:nvPr>
-            <p:ph idx="1"/>
-          </p:nvPr>
-        </p:nvSpPr>
-        <p:spPr>
-          <a:xfrm>
-            <a:off x="594179" y="1807749"/>
-            <a:ext cx="9052560" cy="2909424"/>
-          </a:xfrm>
-        </p:spPr>
-        <p:txBody>
-          <a:bodyPr/>
-          <a:lstStyle/>
-          <a:p>
-            <a:r>
-              <a:rPr lang="en-US" dirty="0" smtClean="0"/>
-              <a:t>Each processing column has a downstream and upstream stack bus</a:t>
-            </a:r>
-          </a:p>
-          <a:p>
-            <a:pPr lvl="1"/>
-            <a:r>
-              <a:rPr lang="en-US" dirty="0" smtClean="0"/>
-              <a:t>Downstream 2048</a:t>
-            </a:r>
-            <a:r>
-              <a:rPr lang="en-US" sz="1800" baseline="70000" dirty="0" smtClean="0"/>
-              <a:t>1</a:t>
-            </a:r>
-            <a:r>
-              <a:rPr lang="en-US" dirty="0" smtClean="0"/>
-              <a:t> bit running at 1GHz providing131Tbps raw system bandwidth</a:t>
-            </a:r>
-          </a:p>
-          <a:p>
-            <a:pPr lvl="1"/>
-            <a:r>
-              <a:rPr lang="en-US" dirty="0" smtClean="0"/>
-              <a:t>Upstream bus 512</a:t>
-            </a:r>
-            <a:r>
-              <a:rPr lang="en-US" sz="1800" baseline="70000" dirty="0"/>
-              <a:t>2</a:t>
-            </a:r>
-            <a:r>
-              <a:rPr lang="en-US" dirty="0" smtClean="0"/>
-              <a:t> bits running at 1GHz</a:t>
-            </a:r>
-          </a:p>
-          <a:p>
-            <a:pPr lvl="2"/>
-            <a:r>
-              <a:rPr lang="en-US" dirty="0"/>
-              <a:t>r</a:t>
-            </a:r>
-            <a:r>
-              <a:rPr lang="en-US" dirty="0" smtClean="0"/>
-              <a:t>esult bandwidth ~1/100</a:t>
-            </a:r>
-            <a:r>
-              <a:rPr lang="en-US" baseline="30000" dirty="0" smtClean="0"/>
-              <a:t>th</a:t>
-            </a:r>
-            <a:r>
-              <a:rPr lang="en-US" dirty="0" smtClean="0"/>
-              <a:t> of operand bandwidth</a:t>
-            </a:r>
-            <a:endParaRPr lang="en-US" dirty="0"/>
-          </a:p>
-        </p:txBody>
-      </p:sp>
-      <p:sp>
-        <p:nvSpPr>
           <p:cNvPr id="4" name="Slide Number Placeholder 3"/>
           <p:cNvSpPr>
             <a:spLocks noGrp="1"/>
@@ -12408,6 +11836,835 @@
                 <a:defRPr/>
               </a:pPr>
               <a:t>20</a:t>
+            </a:fld>
+            <a:endParaRPr lang="en-US"/>
+          </a:p>
+        </p:txBody>
+      </p:sp>
+      <p:sp>
+        <p:nvSpPr>
+          <p:cNvPr id="5" name="Title 1"/>
+          <p:cNvSpPr txBox="1">
+            <a:spLocks/>
+          </p:cNvSpPr>
+          <p:nvPr/>
+        </p:nvSpPr>
+        <p:spPr bwMode="auto">
+          <a:xfrm>
+            <a:off x="502920" y="619551"/>
+            <a:ext cx="9052560" cy="1210839"/>
+          </a:xfrm>
+          <a:prstGeom prst="rect">
+            <a:avLst/>
+          </a:prstGeom>
+          <a:noFill/>
+          <a:ln>
+            <a:noFill/>
+          </a:ln>
+          <a:extLst>
+            <a:ext uri="{909E8E84-426E-40dd-AFC4-6F175D3DCCD1}">
+              <a14:hiddenFill xmlns:a14="http://schemas.microsoft.com/office/drawing/2010/main">
+                <a:solidFill>
+                  <a:srgbClr val="FFFFFF"/>
+                </a:solidFill>
+              </a14:hiddenFill>
+            </a:ext>
+            <a:ext uri="{91240B29-F687-4f45-9708-019B960494DF}">
+              <a14:hiddenLine xmlns:a14="http://schemas.microsoft.com/office/drawing/2010/main" w="9525">
+                <a:solidFill>
+                  <a:srgbClr val="000000"/>
+                </a:solidFill>
+                <a:miter lim="800000"/>
+                <a:headEnd/>
+                <a:tailEnd/>
+              </a14:hiddenLine>
+            </a:ext>
+            <a:ext uri="{FAA26D3D-D897-4be2-8F04-BA451C77F1D7}">
+              <ma14:placeholderFlag xmlns:ma14="http://schemas.microsoft.com/office/mac/drawingml/2011/main" val="1"/>
+            </a:ext>
+          </a:extLst>
+        </p:spPr>
+        <p:txBody>
+          <a:bodyPr vert="horz" wrap="square" lIns="101882" tIns="50941" rIns="101882" bIns="50941" numCol="1" anchor="ctr" anchorCtr="0" compatLnSpc="1">
+            <a:prstTxWarp prst="textNoShape">
+              <a:avLst/>
+            </a:prstTxWarp>
+          </a:bodyPr>
+          <a:lstStyle>
+            <a:lvl1pPr algn="ctr" defTabSz="509412" rtl="0" eaLnBrk="1" fontAlgn="base" hangingPunct="1">
+              <a:spcBef>
+                <a:spcPct val="0"/>
+              </a:spcBef>
+              <a:spcAft>
+                <a:spcPct val="0"/>
+              </a:spcAft>
+              <a:defRPr sz="3600" b="1" kern="1200">
+                <a:solidFill>
+                  <a:schemeClr val="tx1"/>
+                </a:solidFill>
+                <a:latin typeface="Arial"/>
+                <a:ea typeface="ＭＳ Ｐゴシック" charset="0"/>
+                <a:cs typeface="Arial"/>
+              </a:defRPr>
+            </a:lvl1pPr>
+            <a:lvl2pPr algn="ctr" defTabSz="509412" rtl="0" eaLnBrk="1" fontAlgn="base" hangingPunct="1">
+              <a:spcBef>
+                <a:spcPct val="0"/>
+              </a:spcBef>
+              <a:spcAft>
+                <a:spcPct val="0"/>
+              </a:spcAft>
+              <a:defRPr sz="3600" b="1">
+                <a:solidFill>
+                  <a:schemeClr val="tx1"/>
+                </a:solidFill>
+                <a:latin typeface="Arial" charset="0"/>
+                <a:ea typeface="ＭＳ Ｐゴシック" charset="0"/>
+              </a:defRPr>
+            </a:lvl2pPr>
+            <a:lvl3pPr algn="ctr" defTabSz="509412" rtl="0" eaLnBrk="1" fontAlgn="base" hangingPunct="1">
+              <a:spcBef>
+                <a:spcPct val="0"/>
+              </a:spcBef>
+              <a:spcAft>
+                <a:spcPct val="0"/>
+              </a:spcAft>
+              <a:defRPr sz="3600" b="1">
+                <a:solidFill>
+                  <a:schemeClr val="tx1"/>
+                </a:solidFill>
+                <a:latin typeface="Arial" charset="0"/>
+                <a:ea typeface="ＭＳ Ｐゴシック" charset="0"/>
+              </a:defRPr>
+            </a:lvl3pPr>
+            <a:lvl4pPr algn="ctr" defTabSz="509412" rtl="0" eaLnBrk="1" fontAlgn="base" hangingPunct="1">
+              <a:spcBef>
+                <a:spcPct val="0"/>
+              </a:spcBef>
+              <a:spcAft>
+                <a:spcPct val="0"/>
+              </a:spcAft>
+              <a:defRPr sz="3600" b="1">
+                <a:solidFill>
+                  <a:schemeClr val="tx1"/>
+                </a:solidFill>
+                <a:latin typeface="Arial" charset="0"/>
+                <a:ea typeface="ＭＳ Ｐゴシック" charset="0"/>
+              </a:defRPr>
+            </a:lvl4pPr>
+            <a:lvl5pPr algn="ctr" defTabSz="509412" rtl="0" eaLnBrk="1" fontAlgn="base" hangingPunct="1">
+              <a:spcBef>
+                <a:spcPct val="0"/>
+              </a:spcBef>
+              <a:spcAft>
+                <a:spcPct val="0"/>
+              </a:spcAft>
+              <a:defRPr sz="3600" b="1">
+                <a:solidFill>
+                  <a:schemeClr val="tx1"/>
+                </a:solidFill>
+                <a:latin typeface="Arial" charset="0"/>
+                <a:ea typeface="ＭＳ Ｐゴシック" charset="0"/>
+              </a:defRPr>
+            </a:lvl5pPr>
+            <a:lvl6pPr marL="509412" algn="ctr" defTabSz="509412" rtl="0" eaLnBrk="1" fontAlgn="base" hangingPunct="1">
+              <a:spcBef>
+                <a:spcPct val="0"/>
+              </a:spcBef>
+              <a:spcAft>
+                <a:spcPct val="0"/>
+              </a:spcAft>
+              <a:defRPr sz="3600" b="1">
+                <a:solidFill>
+                  <a:schemeClr val="tx1"/>
+                </a:solidFill>
+                <a:latin typeface="Arial" charset="0"/>
+                <a:ea typeface="ＭＳ Ｐゴシック" charset="0"/>
+              </a:defRPr>
+            </a:lvl6pPr>
+            <a:lvl7pPr marL="1018824" algn="ctr" defTabSz="509412" rtl="0" eaLnBrk="1" fontAlgn="base" hangingPunct="1">
+              <a:spcBef>
+                <a:spcPct val="0"/>
+              </a:spcBef>
+              <a:spcAft>
+                <a:spcPct val="0"/>
+              </a:spcAft>
+              <a:defRPr sz="3600" b="1">
+                <a:solidFill>
+                  <a:schemeClr val="tx1"/>
+                </a:solidFill>
+                <a:latin typeface="Arial" charset="0"/>
+                <a:ea typeface="ＭＳ Ｐゴシック" charset="0"/>
+              </a:defRPr>
+            </a:lvl7pPr>
+            <a:lvl8pPr marL="1528237" algn="ctr" defTabSz="509412" rtl="0" eaLnBrk="1" fontAlgn="base" hangingPunct="1">
+              <a:spcBef>
+                <a:spcPct val="0"/>
+              </a:spcBef>
+              <a:spcAft>
+                <a:spcPct val="0"/>
+              </a:spcAft>
+              <a:defRPr sz="3600" b="1">
+                <a:solidFill>
+                  <a:schemeClr val="tx1"/>
+                </a:solidFill>
+                <a:latin typeface="Arial" charset="0"/>
+                <a:ea typeface="ＭＳ Ｐゴシック" charset="0"/>
+              </a:defRPr>
+            </a:lvl8pPr>
+            <a:lvl9pPr marL="2037649" algn="ctr" defTabSz="509412" rtl="0" eaLnBrk="1" fontAlgn="base" hangingPunct="1">
+              <a:spcBef>
+                <a:spcPct val="0"/>
+              </a:spcBef>
+              <a:spcAft>
+                <a:spcPct val="0"/>
+              </a:spcAft>
+              <a:defRPr sz="3600" b="1">
+                <a:solidFill>
+                  <a:schemeClr val="tx1"/>
+                </a:solidFill>
+                <a:latin typeface="Arial" charset="0"/>
+                <a:ea typeface="ＭＳ Ｐゴシック" charset="0"/>
+              </a:defRPr>
+            </a:lvl9pPr>
+          </a:lstStyle>
+          <a:p>
+            <a:r>
+              <a:rPr lang="en-US" dirty="0" smtClean="0"/>
+              <a:t>Instruction Format</a:t>
+            </a:r>
+            <a:endParaRPr lang="en-US" dirty="0"/>
+          </a:p>
+        </p:txBody>
+      </p:sp>
+      <p:sp>
+        <p:nvSpPr>
+          <p:cNvPr id="6" name="Content Placeholder 2"/>
+          <p:cNvSpPr txBox="1">
+            <a:spLocks/>
+          </p:cNvSpPr>
+          <p:nvPr/>
+        </p:nvSpPr>
+        <p:spPr bwMode="auto">
+          <a:xfrm>
+            <a:off x="502920" y="1805942"/>
+            <a:ext cx="9052560" cy="4838698"/>
+          </a:xfrm>
+          <a:prstGeom prst="rect">
+            <a:avLst/>
+          </a:prstGeom>
+          <a:noFill/>
+          <a:ln>
+            <a:noFill/>
+          </a:ln>
+          <a:extLst>
+            <a:ext uri="{909E8E84-426E-40dd-AFC4-6F175D3DCCD1}">
+              <a14:hiddenFill xmlns:a14="http://schemas.microsoft.com/office/drawing/2010/main">
+                <a:solidFill>
+                  <a:srgbClr val="FFFFFF"/>
+                </a:solidFill>
+              </a14:hiddenFill>
+            </a:ext>
+            <a:ext uri="{91240B29-F687-4f45-9708-019B960494DF}">
+              <a14:hiddenLine xmlns:a14="http://schemas.microsoft.com/office/drawing/2010/main" w="9525">
+                <a:solidFill>
+                  <a:srgbClr val="000000"/>
+                </a:solidFill>
+                <a:miter lim="800000"/>
+                <a:headEnd/>
+                <a:tailEnd/>
+              </a14:hiddenLine>
+            </a:ext>
+            <a:ext uri="{FAA26D3D-D897-4be2-8F04-BA451C77F1D7}">
+              <ma14:placeholderFlag xmlns:ma14="http://schemas.microsoft.com/office/mac/drawingml/2011/main" val="1"/>
+            </a:ext>
+          </a:extLst>
+        </p:spPr>
+        <p:txBody>
+          <a:bodyPr vert="horz" wrap="square" lIns="101882" tIns="50941" rIns="101882" bIns="50941" numCol="1" anchor="t" anchorCtr="0" compatLnSpc="1">
+            <a:prstTxWarp prst="textNoShape">
+              <a:avLst/>
+            </a:prstTxWarp>
+            <a:normAutofit fontScale="55000" lnSpcReduction="20000"/>
+          </a:bodyPr>
+          <a:lstStyle>
+            <a:lvl1pPr marL="382059" indent="-382059" algn="l" defTabSz="509412" rtl="0" eaLnBrk="1" fontAlgn="base" hangingPunct="1">
+              <a:lnSpc>
+                <a:spcPct val="100000"/>
+              </a:lnSpc>
+              <a:spcBef>
+                <a:spcPct val="20000"/>
+              </a:spcBef>
+              <a:spcAft>
+                <a:spcPts val="300"/>
+              </a:spcAft>
+              <a:buFont typeface="Arial" charset="0"/>
+              <a:buChar char="•"/>
+              <a:defRPr sz="2800" kern="1200">
+                <a:solidFill>
+                  <a:schemeClr val="tx1"/>
+                </a:solidFill>
+                <a:latin typeface="Arial"/>
+                <a:ea typeface="ＭＳ Ｐゴシック" charset="0"/>
+                <a:cs typeface="Arial"/>
+              </a:defRPr>
+            </a:lvl1pPr>
+            <a:lvl2pPr marL="827795" indent="-318383" algn="l" defTabSz="509412" rtl="0" eaLnBrk="1" fontAlgn="base" hangingPunct="1">
+              <a:lnSpc>
+                <a:spcPct val="100000"/>
+              </a:lnSpc>
+              <a:spcBef>
+                <a:spcPct val="20000"/>
+              </a:spcBef>
+              <a:spcAft>
+                <a:spcPts val="300"/>
+              </a:spcAft>
+              <a:buFont typeface="Arial" charset="0"/>
+              <a:buChar char="–"/>
+              <a:defRPr sz="2400" kern="1200">
+                <a:solidFill>
+                  <a:schemeClr val="tx1"/>
+                </a:solidFill>
+                <a:latin typeface="Arial"/>
+                <a:ea typeface="ＭＳ Ｐゴシック" charset="0"/>
+                <a:cs typeface="Arial"/>
+              </a:defRPr>
+            </a:lvl2pPr>
+            <a:lvl3pPr marL="1273531" indent="-254706" algn="l" defTabSz="509412" rtl="0" eaLnBrk="1" fontAlgn="base" hangingPunct="1">
+              <a:lnSpc>
+                <a:spcPct val="100000"/>
+              </a:lnSpc>
+              <a:spcBef>
+                <a:spcPct val="20000"/>
+              </a:spcBef>
+              <a:spcAft>
+                <a:spcPts val="300"/>
+              </a:spcAft>
+              <a:buFont typeface="Arial" charset="0"/>
+              <a:buChar char="•"/>
+              <a:defRPr sz="2000" kern="1200">
+                <a:solidFill>
+                  <a:schemeClr val="tx1"/>
+                </a:solidFill>
+                <a:latin typeface="Arial"/>
+                <a:ea typeface="ＭＳ Ｐゴシック" charset="0"/>
+                <a:cs typeface="Arial"/>
+              </a:defRPr>
+            </a:lvl3pPr>
+            <a:lvl4pPr marL="1782943" indent="-254706" algn="l" defTabSz="509412" rtl="0" eaLnBrk="1" fontAlgn="base" hangingPunct="1">
+              <a:lnSpc>
+                <a:spcPct val="100000"/>
+              </a:lnSpc>
+              <a:spcBef>
+                <a:spcPct val="20000"/>
+              </a:spcBef>
+              <a:spcAft>
+                <a:spcPts val="300"/>
+              </a:spcAft>
+              <a:buFont typeface="Arial" charset="0"/>
+              <a:buChar char="–"/>
+              <a:defRPr sz="1800" kern="1200">
+                <a:solidFill>
+                  <a:schemeClr val="tx1"/>
+                </a:solidFill>
+                <a:latin typeface="Arial"/>
+                <a:ea typeface="ＭＳ Ｐゴシック" charset="0"/>
+                <a:cs typeface="Arial"/>
+              </a:defRPr>
+            </a:lvl4pPr>
+            <a:lvl5pPr marL="2292355" indent="-254706" algn="l" defTabSz="509412" rtl="0" eaLnBrk="1" fontAlgn="base" hangingPunct="1">
+              <a:lnSpc>
+                <a:spcPct val="100000"/>
+              </a:lnSpc>
+              <a:spcBef>
+                <a:spcPct val="20000"/>
+              </a:spcBef>
+              <a:spcAft>
+                <a:spcPts val="300"/>
+              </a:spcAft>
+              <a:buFont typeface="Arial" charset="0"/>
+              <a:buChar char="»"/>
+              <a:defRPr sz="1800" kern="1200">
+                <a:solidFill>
+                  <a:schemeClr val="tx1"/>
+                </a:solidFill>
+                <a:latin typeface="Arial"/>
+                <a:ea typeface="ＭＳ Ｐゴシック" charset="0"/>
+                <a:cs typeface="Arial"/>
+              </a:defRPr>
+            </a:lvl5pPr>
+            <a:lvl6pPr marL="2801767" indent="-254706" algn="l" defTabSz="509412" rtl="0" eaLnBrk="1" latinLnBrk="0" hangingPunct="1">
+              <a:spcBef>
+                <a:spcPct val="20000"/>
+              </a:spcBef>
+              <a:buFont typeface="Arial"/>
+              <a:buChar char="•"/>
+              <a:defRPr sz="2200" kern="1200">
+                <a:solidFill>
+                  <a:schemeClr val="tx1"/>
+                </a:solidFill>
+                <a:latin typeface="+mn-lt"/>
+                <a:ea typeface="+mn-ea"/>
+                <a:cs typeface="+mn-cs"/>
+              </a:defRPr>
+            </a:lvl6pPr>
+            <a:lvl7pPr marL="3311180" indent="-254706" algn="l" defTabSz="509412" rtl="0" eaLnBrk="1" latinLnBrk="0" hangingPunct="1">
+              <a:spcBef>
+                <a:spcPct val="20000"/>
+              </a:spcBef>
+              <a:buFont typeface="Arial"/>
+              <a:buChar char="•"/>
+              <a:defRPr sz="2200" kern="1200">
+                <a:solidFill>
+                  <a:schemeClr val="tx1"/>
+                </a:solidFill>
+                <a:latin typeface="+mn-lt"/>
+                <a:ea typeface="+mn-ea"/>
+                <a:cs typeface="+mn-cs"/>
+              </a:defRPr>
+            </a:lvl7pPr>
+            <a:lvl8pPr marL="3820592" indent="-254706" algn="l" defTabSz="509412" rtl="0" eaLnBrk="1" latinLnBrk="0" hangingPunct="1">
+              <a:spcBef>
+                <a:spcPct val="20000"/>
+              </a:spcBef>
+              <a:buFont typeface="Arial"/>
+              <a:buChar char="•"/>
+              <a:defRPr sz="2200" kern="1200">
+                <a:solidFill>
+                  <a:schemeClr val="tx1"/>
+                </a:solidFill>
+                <a:latin typeface="+mn-lt"/>
+                <a:ea typeface="+mn-ea"/>
+                <a:cs typeface="+mn-cs"/>
+              </a:defRPr>
+            </a:lvl8pPr>
+            <a:lvl9pPr marL="4330004" indent="-254706" algn="l" defTabSz="509412" rtl="0" eaLnBrk="1" latinLnBrk="0" hangingPunct="1">
+              <a:spcBef>
+                <a:spcPct val="20000"/>
+              </a:spcBef>
+              <a:buFont typeface="Arial"/>
+              <a:buChar char="•"/>
+              <a:defRPr sz="2200" kern="1200">
+                <a:solidFill>
+                  <a:schemeClr val="tx1"/>
+                </a:solidFill>
+                <a:latin typeface="+mn-lt"/>
+                <a:ea typeface="+mn-ea"/>
+                <a:cs typeface="+mn-cs"/>
+              </a:defRPr>
+            </a:lvl9pPr>
+          </a:lstStyle>
+          <a:p>
+            <a:r>
+              <a:rPr lang="en-US" dirty="0" smtClean="0"/>
+              <a:t>Instructions formed from a set of descriptors</a:t>
+            </a:r>
+          </a:p>
+          <a:p>
+            <a:r>
+              <a:rPr lang="en-US" dirty="0" smtClean="0"/>
+              <a:t>Descriptors for:</a:t>
+            </a:r>
+          </a:p>
+          <a:p>
+            <a:pPr lvl="1"/>
+            <a:r>
+              <a:rPr lang="en-US" dirty="0" smtClean="0"/>
+              <a:t>Operations</a:t>
+            </a:r>
+          </a:p>
+          <a:p>
+            <a:pPr lvl="1"/>
+            <a:r>
+              <a:rPr lang="en-US" dirty="0" smtClean="0"/>
+              <a:t>memory Read</a:t>
+            </a:r>
+          </a:p>
+          <a:p>
+            <a:pPr lvl="1"/>
+            <a:r>
+              <a:rPr lang="en-US" dirty="0" smtClean="0"/>
+              <a:t>memory Write</a:t>
+            </a:r>
+          </a:p>
+          <a:p>
+            <a:pPr lvl="1"/>
+            <a:r>
+              <a:rPr lang="en-US" dirty="0" smtClean="0"/>
+              <a:t>access method</a:t>
+            </a:r>
+          </a:p>
+          <a:p>
+            <a:r>
+              <a:rPr lang="en-US" dirty="0" smtClean="0"/>
+              <a:t>Operation descriptor</a:t>
+            </a:r>
+          </a:p>
+          <a:p>
+            <a:pPr lvl="1"/>
+            <a:r>
+              <a:rPr lang="en-US" dirty="0" smtClean="0"/>
+              <a:t>defines SIMD and </a:t>
+            </a:r>
+            <a:r>
+              <a:rPr lang="en-US" dirty="0" err="1" smtClean="0"/>
+              <a:t>stOp</a:t>
+            </a:r>
+            <a:r>
+              <a:rPr lang="en-US" dirty="0" smtClean="0"/>
+              <a:t> operations</a:t>
+            </a:r>
+          </a:p>
+          <a:p>
+            <a:pPr lvl="1"/>
+            <a:r>
+              <a:rPr lang="en-US" dirty="0" smtClean="0"/>
+              <a:t>SIMD and </a:t>
+            </a:r>
+            <a:r>
+              <a:rPr lang="en-US" dirty="0" err="1" smtClean="0"/>
+              <a:t>StOp</a:t>
+            </a:r>
+            <a:r>
+              <a:rPr lang="en-US" dirty="0" smtClean="0"/>
+              <a:t> operation stored in PE instruction memory</a:t>
+            </a:r>
+          </a:p>
+          <a:p>
+            <a:pPr lvl="1"/>
+            <a:r>
+              <a:rPr lang="en-US" dirty="0" smtClean="0"/>
+              <a:t>descriptors point to instructions in PE IM</a:t>
+            </a:r>
+          </a:p>
+          <a:p>
+            <a:r>
+              <a:rPr lang="en-US" dirty="0"/>
+              <a:t>M</a:t>
+            </a:r>
+            <a:r>
+              <a:rPr lang="en-US" dirty="0" smtClean="0"/>
+              <a:t>emory read and write Descriptor</a:t>
+            </a:r>
+          </a:p>
+          <a:p>
+            <a:pPr lvl="1"/>
+            <a:r>
+              <a:rPr lang="en-US" dirty="0" smtClean="0"/>
+              <a:t>sets start address</a:t>
+            </a:r>
+          </a:p>
+          <a:p>
+            <a:pPr lvl="1"/>
+            <a:r>
+              <a:rPr lang="en-US" dirty="0" smtClean="0"/>
+              <a:t>describes how address is accessed</a:t>
+            </a:r>
+          </a:p>
+          <a:p>
+            <a:pPr lvl="2"/>
+            <a:r>
+              <a:rPr lang="en-US" dirty="0" smtClean="0"/>
+              <a:t>bank/page/word increment order</a:t>
+            </a:r>
+          </a:p>
+          <a:p>
+            <a:pPr lvl="2"/>
+            <a:r>
+              <a:rPr lang="en-US" dirty="0" smtClean="0"/>
+              <a:t>how data is transferred to stack bus and on to PE</a:t>
+            </a:r>
+          </a:p>
+          <a:p>
+            <a:pPr lvl="1"/>
+            <a:r>
+              <a:rPr lang="en-US" dirty="0" smtClean="0"/>
+              <a:t>memory descriptor points to an access descriptor that is stored in manager memory</a:t>
+            </a:r>
+          </a:p>
+          <a:p>
+            <a:pPr lvl="1"/>
+            <a:r>
+              <a:rPr lang="en-US" dirty="0" smtClean="0"/>
+              <a:t>expect commonality amongst access methods so many descriptors may point to same access descriptor</a:t>
+            </a:r>
+          </a:p>
+          <a:p>
+            <a:r>
+              <a:rPr lang="en-US" dirty="0" smtClean="0"/>
+              <a:t>Access descriptor</a:t>
+            </a:r>
+          </a:p>
+          <a:p>
+            <a:pPr lvl="1"/>
+            <a:r>
+              <a:rPr lang="en-US" dirty="0" smtClean="0"/>
+              <a:t>not used in the actual instruction</a:t>
+            </a:r>
+          </a:p>
+          <a:p>
+            <a:pPr lvl="1"/>
+            <a:r>
+              <a:rPr lang="en-US" dirty="0" smtClean="0"/>
+              <a:t>expect some commonality between memory read and writes so avoid replicating access descriptor</a:t>
+            </a:r>
+          </a:p>
+        </p:txBody>
+      </p:sp>
+    </p:spTree>
+    <p:extLst>
+      <p:ext uri="{BB962C8B-B14F-4D97-AF65-F5344CB8AC3E}">
+        <p14:creationId xmlns:p14="http://schemas.microsoft.com/office/powerpoint/2010/main" val="2310106255"/>
+      </p:ext>
+    </p:extLst>
+  </p:cSld>
+  <p:clrMapOvr>
+    <a:masterClrMapping/>
+  </p:clrMapOvr>
+</p:sld>
+</file>
+
+<file path=ppt/slides/slide21.xml><?xml version="1.0" encoding="utf-8"?>
+<p:sld xmlns:a="http://schemas.openxmlformats.org/drawingml/2006/main" xmlns:r="http://schemas.openxmlformats.org/officeDocument/2006/relationships" xmlns:p="http://schemas.openxmlformats.org/presentationml/2006/main">
+  <p:cSld>
+    <p:spTree>
+      <p:nvGrpSpPr>
+        <p:cNvPr id="1" name=""/>
+        <p:cNvGrpSpPr/>
+        <p:nvPr/>
+      </p:nvGrpSpPr>
+      <p:grpSpPr>
+        <a:xfrm>
+          <a:off x="0" y="0"/>
+          <a:ext cx="0" cy="0"/>
+          <a:chOff x="0" y="0"/>
+          <a:chExt cx="0" cy="0"/>
+        </a:xfrm>
+      </p:grpSpPr>
+      <p:sp>
+        <p:nvSpPr>
+          <p:cNvPr id="2" name="Title 1"/>
+          <p:cNvSpPr>
+            <a:spLocks noGrp="1"/>
+          </p:cNvSpPr>
+          <p:nvPr>
+            <p:ph type="title"/>
+          </p:nvPr>
+        </p:nvSpPr>
+        <p:spPr>
+          <a:xfrm>
+            <a:off x="502920" y="1020130"/>
+            <a:ext cx="5998564" cy="2690303"/>
+          </a:xfrm>
+        </p:spPr>
+        <p:txBody>
+          <a:bodyPr/>
+          <a:lstStyle/>
+          <a:p>
+            <a:pPr algn="l"/>
+            <a:r>
+              <a:rPr lang="en-US" dirty="0" smtClean="0"/>
+              <a:t>3D Stack Bus</a:t>
+            </a:r>
+            <a:endParaRPr lang="en-US" dirty="0"/>
+          </a:p>
+        </p:txBody>
+      </p:sp>
+      <p:sp>
+        <p:nvSpPr>
+          <p:cNvPr id="4" name="Slide Number Placeholder 3"/>
+          <p:cNvSpPr>
+            <a:spLocks noGrp="1"/>
+          </p:cNvSpPr>
+          <p:nvPr>
+            <p:ph type="sldNum" sz="quarter" idx="12"/>
+          </p:nvPr>
+        </p:nvSpPr>
+        <p:spPr/>
+        <p:txBody>
+          <a:bodyPr/>
+          <a:lstStyle/>
+          <a:p>
+            <a:pPr>
+              <a:defRPr/>
+            </a:pPr>
+            <a:fld id="{3FF2C605-4958-CF43-AA48-80339EFDB0AF}" type="slidenum">
+              <a:rPr lang="en-US" smtClean="0"/>
+              <a:pPr>
+                <a:defRPr/>
+              </a:pPr>
+              <a:t>21</a:t>
+            </a:fld>
+            <a:endParaRPr lang="en-US"/>
+          </a:p>
+        </p:txBody>
+      </p:sp>
+    </p:spTree>
+    <p:extLst>
+      <p:ext uri="{BB962C8B-B14F-4D97-AF65-F5344CB8AC3E}">
+        <p14:creationId xmlns:p14="http://schemas.microsoft.com/office/powerpoint/2010/main" val="2180409873"/>
+      </p:ext>
+    </p:extLst>
+  </p:cSld>
+  <p:clrMapOvr>
+    <a:masterClrMapping/>
+  </p:clrMapOvr>
+  <p:timing>
+    <p:tnLst>
+      <p:par>
+        <p:cTn xmlns:p14="http://schemas.microsoft.com/office/powerpoint/2010/main" id="1" dur="indefinite" restart="never" nodeType="tmRoot"/>
+      </p:par>
+    </p:tnLst>
+  </p:timing>
+</p:sld>
+</file>
+
+<file path=ppt/slides/slide22.xml><?xml version="1.0" encoding="utf-8"?>
+<p:sld xmlns:a="http://schemas.openxmlformats.org/drawingml/2006/main" xmlns:r="http://schemas.openxmlformats.org/officeDocument/2006/relationships" xmlns:p="http://schemas.openxmlformats.org/presentationml/2006/main">
+  <p:cSld>
+    <p:spTree>
+      <p:nvGrpSpPr>
+        <p:cNvPr id="1" name=""/>
+        <p:cNvGrpSpPr/>
+        <p:nvPr/>
+      </p:nvGrpSpPr>
+      <p:grpSpPr>
+        <a:xfrm>
+          <a:off x="0" y="0"/>
+          <a:ext cx="0" cy="0"/>
+          <a:chOff x="0" y="0"/>
+          <a:chExt cx="0" cy="0"/>
+        </a:xfrm>
+      </p:grpSpPr>
+      <p:sp>
+        <p:nvSpPr>
+          <p:cNvPr id="2" name="Title 1"/>
+          <p:cNvSpPr>
+            <a:spLocks noGrp="1"/>
+          </p:cNvSpPr>
+          <p:nvPr>
+            <p:ph type="title"/>
+          </p:nvPr>
+        </p:nvSpPr>
+        <p:spPr>
+          <a:xfrm>
+            <a:off x="502920" y="603543"/>
+            <a:ext cx="9052560" cy="1210839"/>
+          </a:xfrm>
+        </p:spPr>
+        <p:txBody>
+          <a:bodyPr/>
+          <a:lstStyle/>
+          <a:p>
+            <a:r>
+              <a:rPr lang="en-US" dirty="0" smtClean="0"/>
+              <a:t>Stack Bus</a:t>
+            </a:r>
+            <a:endParaRPr lang="en-US" dirty="0"/>
+          </a:p>
+        </p:txBody>
+      </p:sp>
+      <p:sp>
+        <p:nvSpPr>
+          <p:cNvPr id="3" name="Content Placeholder 2"/>
+          <p:cNvSpPr>
+            <a:spLocks noGrp="1"/>
+          </p:cNvSpPr>
+          <p:nvPr>
+            <p:ph idx="1"/>
+          </p:nvPr>
+        </p:nvSpPr>
+        <p:spPr>
+          <a:xfrm>
+            <a:off x="594179" y="1807749"/>
+            <a:ext cx="9052560" cy="2909424"/>
+          </a:xfrm>
+        </p:spPr>
+        <p:txBody>
+          <a:bodyPr/>
+          <a:lstStyle/>
+          <a:p>
+            <a:r>
+              <a:rPr lang="en-US" dirty="0" smtClean="0"/>
+              <a:t>Each processing column has a downstream and upstream stack bus</a:t>
+            </a:r>
+          </a:p>
+          <a:p>
+            <a:pPr lvl="1"/>
+            <a:r>
+              <a:rPr lang="en-US" dirty="0" smtClean="0"/>
+              <a:t>Downstream 2048</a:t>
+            </a:r>
+            <a:r>
+              <a:rPr lang="en-US" sz="1800" baseline="70000" dirty="0" smtClean="0"/>
+              <a:t>1</a:t>
+            </a:r>
+            <a:r>
+              <a:rPr lang="en-US" dirty="0" smtClean="0"/>
+              <a:t> bit running at 1GHz providing131Tbps raw system bandwidth</a:t>
+            </a:r>
+          </a:p>
+          <a:p>
+            <a:pPr lvl="1"/>
+            <a:r>
+              <a:rPr lang="en-US" dirty="0" smtClean="0"/>
+              <a:t>Upstream bus 512</a:t>
+            </a:r>
+            <a:r>
+              <a:rPr lang="en-US" sz="1800" baseline="70000" dirty="0"/>
+              <a:t>2</a:t>
+            </a:r>
+            <a:r>
+              <a:rPr lang="en-US" dirty="0" smtClean="0"/>
+              <a:t> bits running at 1GHz</a:t>
+            </a:r>
+          </a:p>
+          <a:p>
+            <a:pPr lvl="2"/>
+            <a:r>
+              <a:rPr lang="en-US" dirty="0"/>
+              <a:t>r</a:t>
+            </a:r>
+            <a:r>
+              <a:rPr lang="en-US" dirty="0" smtClean="0"/>
+              <a:t>esult bandwidth ~1/100</a:t>
+            </a:r>
+            <a:r>
+              <a:rPr lang="en-US" baseline="30000" dirty="0" smtClean="0"/>
+              <a:t>th</a:t>
+            </a:r>
+            <a:r>
+              <a:rPr lang="en-US" dirty="0" smtClean="0"/>
+              <a:t> of operand bandwidth</a:t>
+            </a:r>
+            <a:endParaRPr lang="en-US" dirty="0"/>
+          </a:p>
+        </p:txBody>
+      </p:sp>
+      <p:sp>
+        <p:nvSpPr>
+          <p:cNvPr id="4" name="Slide Number Placeholder 3"/>
+          <p:cNvSpPr>
+            <a:spLocks noGrp="1"/>
+          </p:cNvSpPr>
+          <p:nvPr>
+            <p:ph type="sldNum" sz="quarter" idx="12"/>
+          </p:nvPr>
+        </p:nvSpPr>
+        <p:spPr/>
+        <p:txBody>
+          <a:bodyPr/>
+          <a:lstStyle/>
+          <a:p>
+            <a:pPr>
+              <a:defRPr/>
+            </a:pPr>
+            <a:fld id="{3FF2C605-4958-CF43-AA48-80339EFDB0AF}" type="slidenum">
+              <a:rPr lang="en-US" smtClean="0"/>
+              <a:pPr>
+                <a:defRPr/>
+              </a:pPr>
+              <a:t>22</a:t>
             </a:fld>
             <a:endParaRPr lang="en-US"/>
           </a:p>
@@ -12463,7 +12720,7 @@
 </p:sld>
 </file>
 
-<file path=ppt/slides/slide21.xml><?xml version="1.0" encoding="utf-8"?>
+<file path=ppt/slides/slide23.xml><?xml version="1.0" encoding="utf-8"?>
 <p:sld xmlns:a="http://schemas.openxmlformats.org/drawingml/2006/main" xmlns:r="http://schemas.openxmlformats.org/officeDocument/2006/relationships" xmlns:p="http://schemas.openxmlformats.org/presentationml/2006/main">
   <p:cSld>
     <p:spTree>
@@ -12614,7 +12871,7 @@
               <a:pPr>
                 <a:defRPr/>
               </a:pPr>
-              <a:t>21</a:t>
+              <a:t>23</a:t>
             </a:fld>
             <a:endParaRPr lang="en-US"/>
           </a:p>
@@ -12640,7 +12897,7 @@
 </p:sld>
 </file>
 
-<file path=ppt/slides/slide22.xml><?xml version="1.0" encoding="utf-8"?>
+<file path=ppt/slides/slide24.xml><?xml version="1.0" encoding="utf-8"?>
 <p:sld xmlns:a="http://schemas.openxmlformats.org/drawingml/2006/main" xmlns:r="http://schemas.openxmlformats.org/officeDocument/2006/relationships" xmlns:p="http://schemas.openxmlformats.org/presentationml/2006/main">
   <p:cSld>
     <p:spTree>
@@ -12713,7 +12970,7 @@
               <a:pPr>
                 <a:defRPr/>
               </a:pPr>
-              <a:t>22</a:t>
+              <a:t>24</a:t>
             </a:fld>
             <a:endParaRPr lang="en-US"/>
           </a:p>
@@ -12739,7 +12996,7 @@
 </p:sld>
 </file>
 
-<file path=ppt/slides/slide23.xml><?xml version="1.0" encoding="utf-8"?>
+<file path=ppt/slides/slide25.xml><?xml version="1.0" encoding="utf-8"?>
 <p:sld xmlns:a="http://schemas.openxmlformats.org/drawingml/2006/main" xmlns:r="http://schemas.openxmlformats.org/officeDocument/2006/relationships" xmlns:p="http://schemas.openxmlformats.org/presentationml/2006/main">
   <p:cSld>
     <p:spTree>
@@ -12866,7 +13123,7 @@
               <a:pPr>
                 <a:defRPr/>
               </a:pPr>
-              <a:t>23</a:t>
+              <a:t>25</a:t>
             </a:fld>
             <a:endParaRPr lang="en-US"/>
           </a:p>
@@ -13163,7 +13420,7 @@
 </p:sld>
 </file>
 
-<file path=ppt/slides/slide24.xml><?xml version="1.0" encoding="utf-8"?>
+<file path=ppt/slides/slide26.xml><?xml version="1.0" encoding="utf-8"?>
 <p:sld xmlns:a="http://schemas.openxmlformats.org/drawingml/2006/main" xmlns:r="http://schemas.openxmlformats.org/officeDocument/2006/relationships" xmlns:p="http://schemas.openxmlformats.org/presentationml/2006/main">
   <p:cSld>
     <p:spTree>
@@ -13285,7 +13542,7 @@
               <a:pPr>
                 <a:defRPr/>
               </a:pPr>
-              <a:t>24</a:t>
+              <a:t>26</a:t>
             </a:fld>
             <a:endParaRPr lang="en-US"/>
           </a:p>
@@ -13304,7 +13561,7 @@
 </p:sld>
 </file>
 
-<file path=ppt/slides/slide25.xml><?xml version="1.0" encoding="utf-8"?>
+<file path=ppt/slides/slide27.xml><?xml version="1.0" encoding="utf-8"?>
 <p:sld xmlns:a="http://schemas.openxmlformats.org/drawingml/2006/main" xmlns:r="http://schemas.openxmlformats.org/officeDocument/2006/relationships" xmlns:p="http://schemas.openxmlformats.org/presentationml/2006/main">
   <p:cSld>
     <p:spTree>
@@ -13373,7 +13630,7 @@
               <a:pPr>
                 <a:defRPr/>
               </a:pPr>
-              <a:t>25</a:t>
+              <a:t>27</a:t>
             </a:fld>
             <a:endParaRPr lang="en-US"/>
           </a:p>
@@ -13399,7 +13656,7 @@
 </p:sld>
 </file>
 
-<file path=ppt/slides/slide26.xml><?xml version="1.0" encoding="utf-8"?>
+<file path=ppt/slides/slide28.xml><?xml version="1.0" encoding="utf-8"?>
 <p:sld xmlns:a="http://schemas.openxmlformats.org/drawingml/2006/main" xmlns:r="http://schemas.openxmlformats.org/officeDocument/2006/relationships" xmlns:p="http://schemas.openxmlformats.org/presentationml/2006/main">
   <p:cSld>
     <p:spTree>
@@ -13509,7 +13766,7 @@
               <a:pPr>
                 <a:defRPr/>
               </a:pPr>
-              <a:t>26</a:t>
+              <a:t>28</a:t>
             </a:fld>
             <a:endParaRPr lang="en-US"/>
           </a:p>
@@ -13805,319 +14062,6 @@
 </p:sld>
 </file>
 
-<file path=ppt/slides/slide27.xml><?xml version="1.0" encoding="utf-8"?>
-<p:sld xmlns:a="http://schemas.openxmlformats.org/drawingml/2006/main" xmlns:r="http://schemas.openxmlformats.org/officeDocument/2006/relationships" xmlns:p="http://schemas.openxmlformats.org/presentationml/2006/main">
-  <p:cSld>
-    <p:spTree>
-      <p:nvGrpSpPr>
-        <p:cNvPr id="1" name=""/>
-        <p:cNvGrpSpPr/>
-        <p:nvPr/>
-      </p:nvGrpSpPr>
-      <p:grpSpPr>
-        <a:xfrm>
-          <a:off x="0" y="0"/>
-          <a:ext cx="0" cy="0"/>
-          <a:chOff x="0" y="0"/>
-          <a:chExt cx="0" cy="0"/>
-        </a:xfrm>
-      </p:grpSpPr>
-      <p:sp>
-        <p:nvSpPr>
-          <p:cNvPr id="2" name="Title 1"/>
-          <p:cNvSpPr>
-            <a:spLocks noGrp="1"/>
-          </p:cNvSpPr>
-          <p:nvPr>
-            <p:ph type="title"/>
-          </p:nvPr>
-        </p:nvSpPr>
-        <p:spPr>
-          <a:xfrm>
-            <a:off x="502920" y="573088"/>
-            <a:ext cx="9052560" cy="1210839"/>
-          </a:xfrm>
-        </p:spPr>
-        <p:txBody>
-          <a:bodyPr/>
-          <a:lstStyle/>
-          <a:p>
-            <a:r>
-              <a:rPr lang="en-US" dirty="0" smtClean="0"/>
-              <a:t>Manager Status</a:t>
-            </a:r>
-            <a:endParaRPr lang="en-US" dirty="0"/>
-          </a:p>
-        </p:txBody>
-      </p:sp>
-      <p:sp>
-        <p:nvSpPr>
-          <p:cNvPr id="3" name="Content Placeholder 2"/>
-          <p:cNvSpPr>
-            <a:spLocks noGrp="1"/>
-          </p:cNvSpPr>
-          <p:nvPr>
-            <p:ph idx="1"/>
-          </p:nvPr>
-        </p:nvSpPr>
-        <p:spPr>
-          <a:xfrm>
-            <a:off x="502920" y="1805942"/>
-            <a:ext cx="9052560" cy="4726938"/>
-          </a:xfrm>
-        </p:spPr>
-        <p:txBody>
-          <a:bodyPr>
-            <a:normAutofit fontScale="85000" lnSpcReduction="10000"/>
-          </a:bodyPr>
-          <a:lstStyle/>
-          <a:p>
-            <a:r>
-              <a:rPr lang="en-US" dirty="0" smtClean="0"/>
-              <a:t>Basic functionality except Memory read and Write are coded</a:t>
-            </a:r>
-          </a:p>
-          <a:p>
-            <a:r>
-              <a:rPr lang="en-US" dirty="0" smtClean="0"/>
-              <a:t>Manager instructions generated from python script</a:t>
-            </a:r>
-          </a:p>
-          <a:p>
-            <a:pPr lvl="1"/>
-            <a:r>
-              <a:rPr lang="en-US" dirty="0" smtClean="0"/>
-              <a:t>instructions include a group of descriptors that specify:</a:t>
-            </a:r>
-          </a:p>
-          <a:p>
-            <a:pPr lvl="2"/>
-            <a:r>
-              <a:rPr lang="en-US" dirty="0" smtClean="0"/>
-              <a:t>PE operation</a:t>
-            </a:r>
-          </a:p>
-          <a:p>
-            <a:pPr lvl="2"/>
-            <a:r>
-              <a:rPr lang="en-US" dirty="0" smtClean="0"/>
-              <a:t>source of weights and inputs</a:t>
-            </a:r>
-          </a:p>
-          <a:p>
-            <a:pPr lvl="2"/>
-            <a:r>
-              <a:rPr lang="en-US" dirty="0" smtClean="0"/>
-              <a:t>where to write results</a:t>
-            </a:r>
-          </a:p>
-          <a:p>
-            <a:pPr lvl="1"/>
-            <a:r>
-              <a:rPr lang="en-US" dirty="0" smtClean="0"/>
-              <a:t>python script generates </a:t>
-            </a:r>
-            <a:r>
-              <a:rPr lang="en-US" dirty="0" err="1" smtClean="0"/>
-              <a:t>readmem</a:t>
-            </a:r>
-            <a:r>
-              <a:rPr lang="en-US" dirty="0" smtClean="0"/>
-              <a:t> files</a:t>
-            </a:r>
-          </a:p>
-          <a:p>
-            <a:r>
-              <a:rPr lang="en-US" dirty="0" smtClean="0"/>
-              <a:t>SV </a:t>
-            </a:r>
-          </a:p>
-          <a:p>
-            <a:pPr lvl="1"/>
-            <a:r>
-              <a:rPr lang="en-US" dirty="0" smtClean="0"/>
-              <a:t>environment still generates neuron weights and inputs to PE</a:t>
-            </a:r>
-          </a:p>
-          <a:p>
-            <a:pPr lvl="1"/>
-            <a:r>
-              <a:rPr lang="en-US" dirty="0" smtClean="0"/>
-              <a:t>Manager code generates configuration packets from instructions</a:t>
-            </a:r>
-          </a:p>
-          <a:p>
-            <a:pPr lvl="1"/>
-            <a:r>
-              <a:rPr lang="en-US" dirty="0" smtClean="0"/>
-              <a:t>Manager code takes results from upstream stack bus and constructs NoC packets for writes to local memory and other manager memory</a:t>
-            </a:r>
-          </a:p>
-        </p:txBody>
-      </p:sp>
-      <p:sp>
-        <p:nvSpPr>
-          <p:cNvPr id="4" name="Slide Number Placeholder 3"/>
-          <p:cNvSpPr>
-            <a:spLocks noGrp="1"/>
-          </p:cNvSpPr>
-          <p:nvPr>
-            <p:ph type="sldNum" sz="quarter" idx="12"/>
-          </p:nvPr>
-        </p:nvSpPr>
-        <p:spPr/>
-        <p:txBody>
-          <a:bodyPr/>
-          <a:lstStyle/>
-          <a:p>
-            <a:pPr>
-              <a:defRPr/>
-            </a:pPr>
-            <a:fld id="{3FF2C605-4958-CF43-AA48-80339EFDB0AF}" type="slidenum">
-              <a:rPr lang="en-US" smtClean="0"/>
-              <a:pPr>
-                <a:defRPr/>
-              </a:pPr>
-              <a:t>27</a:t>
-            </a:fld>
-            <a:endParaRPr lang="en-US"/>
-          </a:p>
-        </p:txBody>
-      </p:sp>
-    </p:spTree>
-    <p:extLst>
-      <p:ext uri="{BB962C8B-B14F-4D97-AF65-F5344CB8AC3E}">
-        <p14:creationId xmlns:p14="http://schemas.microsoft.com/office/powerpoint/2010/main" val="951400678"/>
-      </p:ext>
-    </p:extLst>
-  </p:cSld>
-  <p:clrMapOvr>
-    <a:masterClrMapping/>
-  </p:clrMapOvr>
-</p:sld>
-</file>
-
-<file path=ppt/slides/slide28.xml><?xml version="1.0" encoding="utf-8"?>
-<p:sld xmlns:a="http://schemas.openxmlformats.org/drawingml/2006/main" xmlns:r="http://schemas.openxmlformats.org/officeDocument/2006/relationships" xmlns:p="http://schemas.openxmlformats.org/presentationml/2006/main">
-  <p:cSld>
-    <p:spTree>
-      <p:nvGrpSpPr>
-        <p:cNvPr id="1" name=""/>
-        <p:cNvGrpSpPr/>
-        <p:nvPr/>
-      </p:nvGrpSpPr>
-      <p:grpSpPr>
-        <a:xfrm>
-          <a:off x="0" y="0"/>
-          <a:ext cx="0" cy="0"/>
-          <a:chOff x="0" y="0"/>
-          <a:chExt cx="0" cy="0"/>
-        </a:xfrm>
-      </p:grpSpPr>
-      <p:sp>
-        <p:nvSpPr>
-          <p:cNvPr id="2" name="Title 1"/>
-          <p:cNvSpPr>
-            <a:spLocks noGrp="1"/>
-          </p:cNvSpPr>
-          <p:nvPr>
-            <p:ph type="title"/>
-          </p:nvPr>
-        </p:nvSpPr>
-        <p:spPr>
-          <a:xfrm>
-            <a:off x="502920" y="816928"/>
-            <a:ext cx="9052560" cy="1210839"/>
-          </a:xfrm>
-        </p:spPr>
-        <p:txBody>
-          <a:bodyPr/>
-          <a:lstStyle/>
-          <a:p>
-            <a:r>
-              <a:rPr lang="en-US" dirty="0"/>
-              <a:t>V</a:t>
-            </a:r>
-            <a:r>
-              <a:rPr lang="en-US" dirty="0" smtClean="0"/>
-              <a:t>erification Block diagram</a:t>
-            </a:r>
-            <a:endParaRPr lang="en-US" dirty="0"/>
-          </a:p>
-        </p:txBody>
-      </p:sp>
-      <p:sp>
-        <p:nvSpPr>
-          <p:cNvPr id="4" name="Slide Number Placeholder 3"/>
-          <p:cNvSpPr>
-            <a:spLocks noGrp="1"/>
-          </p:cNvSpPr>
-          <p:nvPr>
-            <p:ph type="sldNum" sz="quarter" idx="12"/>
-          </p:nvPr>
-        </p:nvSpPr>
-        <p:spPr/>
-        <p:txBody>
-          <a:bodyPr/>
-          <a:lstStyle/>
-          <a:p>
-            <a:pPr>
-              <a:defRPr/>
-            </a:pPr>
-            <a:fld id="{3FF2C605-4958-CF43-AA48-80339EFDB0AF}" type="slidenum">
-              <a:rPr lang="en-US" smtClean="0"/>
-              <a:pPr>
-                <a:defRPr/>
-              </a:pPr>
-              <a:t>28</a:t>
-            </a:fld>
-            <a:endParaRPr lang="en-US"/>
-          </a:p>
-        </p:txBody>
-      </p:sp>
-      <p:pic>
-        <p:nvPicPr>
-          <p:cNvPr id="5" name="Content Placeholder 4" descr="VerificationBlockDiagram.pdf"/>
-          <p:cNvPicPr>
-            <a:picLocks noGrp="1" noChangeAspect="1"/>
-          </p:cNvPicPr>
-          <p:nvPr>
-            <p:ph idx="1"/>
-          </p:nvPr>
-        </p:nvPicPr>
-        <p:blipFill>
-          <a:blip r:embed="rId2">
-            <a:extLst>
-              <a:ext uri="{28A0092B-C50C-407E-A947-70E740481C1C}">
-                <a14:useLocalDpi xmlns:a14="http://schemas.microsoft.com/office/drawing/2010/main" val="0"/>
-              </a:ext>
-            </a:extLst>
-          </a:blip>
-          <a:srcRect l="-7965" r="-7965"/>
-          <a:stretch>
-            <a:fillRect/>
-          </a:stretch>
-        </p:blipFill>
-        <p:spPr>
-          <a:xfrm>
-            <a:off x="279400" y="2194561"/>
-            <a:ext cx="9527596" cy="3701946"/>
-          </a:xfrm>
-        </p:spPr>
-      </p:pic>
-    </p:spTree>
-    <p:extLst>
-      <p:ext uri="{BB962C8B-B14F-4D97-AF65-F5344CB8AC3E}">
-        <p14:creationId xmlns:p14="http://schemas.microsoft.com/office/powerpoint/2010/main" val="2984994303"/>
-      </p:ext>
-    </p:extLst>
-  </p:cSld>
-  <p:clrMapOvr>
-    <a:masterClrMapping/>
-  </p:clrMapOvr>
-</p:sld>
-</file>
-
 <file path=ppt/slides/slide29.xml><?xml version="1.0" encoding="utf-8"?>
 <p:sld xmlns:a="http://schemas.openxmlformats.org/drawingml/2006/main" xmlns:r="http://schemas.openxmlformats.org/officeDocument/2006/relationships" xmlns:p="http://schemas.openxmlformats.org/presentationml/2006/main">
   <p:cSld>
@@ -14147,7 +14091,7 @@
         </p:nvSpPr>
         <p:spPr>
           <a:xfrm>
-            <a:off x="502920" y="695008"/>
+            <a:off x="502920" y="573088"/>
             <a:ext cx="9052560" cy="1210839"/>
           </a:xfrm>
         </p:spPr>
@@ -14157,42 +14101,117 @@
           <a:p>
             <a:r>
               <a:rPr lang="en-US" dirty="0" smtClean="0"/>
-              <a:t>Instruction Communication</a:t>
+              <a:t>Manager Status</a:t>
             </a:r>
             <a:endParaRPr lang="en-US" dirty="0"/>
           </a:p>
         </p:txBody>
       </p:sp>
-      <p:pic>
-        <p:nvPicPr>
-          <p:cNvPr id="5" name="Content Placeholder 4" descr="InstructionWaveform.pdf"/>
-          <p:cNvPicPr>
-            <a:picLocks noGrp="1" noChangeAspect="1"/>
-          </p:cNvPicPr>
+      <p:sp>
+        <p:nvSpPr>
+          <p:cNvPr id="3" name="Content Placeholder 2"/>
+          <p:cNvSpPr>
+            <a:spLocks noGrp="1"/>
+          </p:cNvSpPr>
           <p:nvPr>
             <p:ph idx="1"/>
           </p:nvPr>
-        </p:nvPicPr>
-        <p:blipFill>
-          <a:blip r:embed="rId2">
-            <a:extLst>
-              <a:ext uri="{28A0092B-C50C-407E-A947-70E740481C1C}">
-                <a14:useLocalDpi xmlns:a14="http://schemas.microsoft.com/office/drawing/2010/main" val="0"/>
-              </a:ext>
-            </a:extLst>
-          </a:blip>
-          <a:srcRect l="-13130" r="-13130"/>
-          <a:stretch>
-            <a:fillRect/>
-          </a:stretch>
-        </p:blipFill>
+        </p:nvSpPr>
         <p:spPr>
           <a:xfrm>
-            <a:off x="502920" y="2633135"/>
-            <a:ext cx="9052560" cy="3517371"/>
+            <a:off x="502920" y="1805942"/>
+            <a:ext cx="9052560" cy="4726938"/>
           </a:xfrm>
         </p:spPr>
-      </p:pic>
+        <p:txBody>
+          <a:bodyPr>
+            <a:normAutofit fontScale="85000" lnSpcReduction="10000"/>
+          </a:bodyPr>
+          <a:lstStyle/>
+          <a:p>
+            <a:r>
+              <a:rPr lang="en-US" dirty="0" smtClean="0"/>
+              <a:t>Basic functionality except Memory read and Write are coded</a:t>
+            </a:r>
+          </a:p>
+          <a:p>
+            <a:r>
+              <a:rPr lang="en-US" dirty="0" smtClean="0"/>
+              <a:t>Manager instructions generated from python script</a:t>
+            </a:r>
+          </a:p>
+          <a:p>
+            <a:pPr lvl="1"/>
+            <a:r>
+              <a:rPr lang="en-US" dirty="0" smtClean="0"/>
+              <a:t>instructions include a group of descriptors that specify:</a:t>
+            </a:r>
+          </a:p>
+          <a:p>
+            <a:pPr lvl="2"/>
+            <a:r>
+              <a:rPr lang="en-US" dirty="0" smtClean="0"/>
+              <a:t>PE operation</a:t>
+            </a:r>
+          </a:p>
+          <a:p>
+            <a:pPr lvl="2"/>
+            <a:r>
+              <a:rPr lang="en-US" dirty="0" smtClean="0"/>
+              <a:t>source of weights and inputs</a:t>
+            </a:r>
+          </a:p>
+          <a:p>
+            <a:pPr lvl="2"/>
+            <a:r>
+              <a:rPr lang="en-US" dirty="0" smtClean="0"/>
+              <a:t>where to write results</a:t>
+            </a:r>
+          </a:p>
+          <a:p>
+            <a:pPr lvl="1"/>
+            <a:r>
+              <a:rPr lang="en-US" dirty="0" smtClean="0"/>
+              <a:t>python script generates </a:t>
+            </a:r>
+            <a:r>
+              <a:rPr lang="en-US" dirty="0" err="1" smtClean="0"/>
+              <a:t>readmem</a:t>
+            </a:r>
+            <a:r>
+              <a:rPr lang="en-US" dirty="0" smtClean="0"/>
+              <a:t> files</a:t>
+            </a:r>
+          </a:p>
+          <a:p>
+            <a:r>
+              <a:rPr lang="en-US" dirty="0" smtClean="0"/>
+              <a:t>SV </a:t>
+            </a:r>
+          </a:p>
+          <a:p>
+            <a:pPr lvl="1"/>
+            <a:r>
+              <a:rPr lang="en-US" dirty="0" smtClean="0"/>
+              <a:t>environment still generates neuron weights and inputs to PE</a:t>
+            </a:r>
+          </a:p>
+          <a:p>
+            <a:pPr lvl="1"/>
+            <a:r>
+              <a:rPr lang="en-US" dirty="0" smtClean="0"/>
+              <a:t>Manager code generates configuration packets from instructions</a:t>
+            </a:r>
+          </a:p>
+          <a:p>
+            <a:pPr lvl="1"/>
+            <a:r>
+              <a:rPr lang="en-US" dirty="0" smtClean="0"/>
+              <a:t>Manager code takes results from upstream stack bus and constructs NoC packets for writes to local memory and other manager memory</a:t>
+            </a:r>
+          </a:p>
+        </p:txBody>
+      </p:sp>
       <p:sp>
         <p:nvSpPr>
           <p:cNvPr id="4" name="Slide Number Placeholder 3"/>
@@ -14225,7 +14244,7 @@
     </p:spTree>
     <p:extLst>
       <p:ext uri="{BB962C8B-B14F-4D97-AF65-F5344CB8AC3E}">
-        <p14:creationId xmlns:p14="http://schemas.microsoft.com/office/powerpoint/2010/main" val="3622917272"/>
+        <p14:creationId xmlns:p14="http://schemas.microsoft.com/office/powerpoint/2010/main" val="951400678"/>
       </p:ext>
     </p:extLst>
   </p:cSld>
@@ -14618,6 +14637,244 @@
         </p:nvSpPr>
         <p:spPr>
           <a:xfrm>
+            <a:off x="502920" y="816928"/>
+            <a:ext cx="9052560" cy="1210839"/>
+          </a:xfrm>
+        </p:spPr>
+        <p:txBody>
+          <a:bodyPr/>
+          <a:lstStyle/>
+          <a:p>
+            <a:r>
+              <a:rPr lang="en-US" dirty="0"/>
+              <a:t>V</a:t>
+            </a:r>
+            <a:r>
+              <a:rPr lang="en-US" dirty="0" smtClean="0"/>
+              <a:t>erification Block diagram</a:t>
+            </a:r>
+            <a:endParaRPr lang="en-US" dirty="0"/>
+          </a:p>
+        </p:txBody>
+      </p:sp>
+      <p:sp>
+        <p:nvSpPr>
+          <p:cNvPr id="4" name="Slide Number Placeholder 3"/>
+          <p:cNvSpPr>
+            <a:spLocks noGrp="1"/>
+          </p:cNvSpPr>
+          <p:nvPr>
+            <p:ph type="sldNum" sz="quarter" idx="12"/>
+          </p:nvPr>
+        </p:nvSpPr>
+        <p:spPr/>
+        <p:txBody>
+          <a:bodyPr/>
+          <a:lstStyle/>
+          <a:p>
+            <a:pPr>
+              <a:defRPr/>
+            </a:pPr>
+            <a:fld id="{3FF2C605-4958-CF43-AA48-80339EFDB0AF}" type="slidenum">
+              <a:rPr lang="en-US" smtClean="0"/>
+              <a:pPr>
+                <a:defRPr/>
+              </a:pPr>
+              <a:t>30</a:t>
+            </a:fld>
+            <a:endParaRPr lang="en-US"/>
+          </a:p>
+        </p:txBody>
+      </p:sp>
+      <p:pic>
+        <p:nvPicPr>
+          <p:cNvPr id="5" name="Content Placeholder 4" descr="VerificationBlockDiagram.pdf"/>
+          <p:cNvPicPr>
+            <a:picLocks noGrp="1" noChangeAspect="1"/>
+          </p:cNvPicPr>
+          <p:nvPr>
+            <p:ph idx="1"/>
+          </p:nvPr>
+        </p:nvPicPr>
+        <p:blipFill>
+          <a:blip r:embed="rId2">
+            <a:extLst>
+              <a:ext uri="{28A0092B-C50C-407E-A947-70E740481C1C}">
+                <a14:useLocalDpi xmlns:a14="http://schemas.microsoft.com/office/drawing/2010/main" val="0"/>
+              </a:ext>
+            </a:extLst>
+          </a:blip>
+          <a:srcRect l="-7965" r="-7965"/>
+          <a:stretch>
+            <a:fillRect/>
+          </a:stretch>
+        </p:blipFill>
+        <p:spPr>
+          <a:xfrm>
+            <a:off x="279400" y="2194561"/>
+            <a:ext cx="9527596" cy="3701946"/>
+          </a:xfrm>
+        </p:spPr>
+      </p:pic>
+    </p:spTree>
+    <p:extLst>
+      <p:ext uri="{BB962C8B-B14F-4D97-AF65-F5344CB8AC3E}">
+        <p14:creationId xmlns:p14="http://schemas.microsoft.com/office/powerpoint/2010/main" val="2984994303"/>
+      </p:ext>
+    </p:extLst>
+  </p:cSld>
+  <p:clrMapOvr>
+    <a:masterClrMapping/>
+  </p:clrMapOvr>
+</p:sld>
+</file>
+
+<file path=ppt/slides/slide31.xml><?xml version="1.0" encoding="utf-8"?>
+<p:sld xmlns:a="http://schemas.openxmlformats.org/drawingml/2006/main" xmlns:r="http://schemas.openxmlformats.org/officeDocument/2006/relationships" xmlns:p="http://schemas.openxmlformats.org/presentationml/2006/main">
+  <p:cSld>
+    <p:spTree>
+      <p:nvGrpSpPr>
+        <p:cNvPr id="1" name=""/>
+        <p:cNvGrpSpPr/>
+        <p:nvPr/>
+      </p:nvGrpSpPr>
+      <p:grpSpPr>
+        <a:xfrm>
+          <a:off x="0" y="0"/>
+          <a:ext cx="0" cy="0"/>
+          <a:chOff x="0" y="0"/>
+          <a:chExt cx="0" cy="0"/>
+        </a:xfrm>
+      </p:grpSpPr>
+      <p:sp>
+        <p:nvSpPr>
+          <p:cNvPr id="2" name="Title 1"/>
+          <p:cNvSpPr>
+            <a:spLocks noGrp="1"/>
+          </p:cNvSpPr>
+          <p:nvPr>
+            <p:ph type="title"/>
+          </p:nvPr>
+        </p:nvSpPr>
+        <p:spPr>
+          <a:xfrm>
+            <a:off x="502920" y="695008"/>
+            <a:ext cx="9052560" cy="1210839"/>
+          </a:xfrm>
+        </p:spPr>
+        <p:txBody>
+          <a:bodyPr/>
+          <a:lstStyle/>
+          <a:p>
+            <a:r>
+              <a:rPr lang="en-US" dirty="0" smtClean="0"/>
+              <a:t>Instruction Communication</a:t>
+            </a:r>
+            <a:endParaRPr lang="en-US" dirty="0"/>
+          </a:p>
+        </p:txBody>
+      </p:sp>
+      <p:pic>
+        <p:nvPicPr>
+          <p:cNvPr id="5" name="Content Placeholder 4" descr="InstructionWaveform.pdf"/>
+          <p:cNvPicPr>
+            <a:picLocks noGrp="1" noChangeAspect="1"/>
+          </p:cNvPicPr>
+          <p:nvPr>
+            <p:ph idx="1"/>
+          </p:nvPr>
+        </p:nvPicPr>
+        <p:blipFill>
+          <a:blip r:embed="rId2">
+            <a:extLst>
+              <a:ext uri="{28A0092B-C50C-407E-A947-70E740481C1C}">
+                <a14:useLocalDpi xmlns:a14="http://schemas.microsoft.com/office/drawing/2010/main" val="0"/>
+              </a:ext>
+            </a:extLst>
+          </a:blip>
+          <a:srcRect l="-13130" r="-13130"/>
+          <a:stretch>
+            <a:fillRect/>
+          </a:stretch>
+        </p:blipFill>
+        <p:spPr>
+          <a:xfrm>
+            <a:off x="502920" y="2633135"/>
+            <a:ext cx="9052560" cy="3517371"/>
+          </a:xfrm>
+        </p:spPr>
+      </p:pic>
+      <p:sp>
+        <p:nvSpPr>
+          <p:cNvPr id="4" name="Slide Number Placeholder 3"/>
+          <p:cNvSpPr>
+            <a:spLocks noGrp="1"/>
+          </p:cNvSpPr>
+          <p:nvPr>
+            <p:ph type="sldNum" sz="quarter" idx="12"/>
+          </p:nvPr>
+        </p:nvSpPr>
+        <p:spPr/>
+        <p:txBody>
+          <a:bodyPr/>
+          <a:lstStyle/>
+          <a:p>
+            <a:pPr>
+              <a:defRPr/>
+            </a:pPr>
+            <a:fld id="{3FF2C605-4958-CF43-AA48-80339EFDB0AF}" type="slidenum">
+              <a:rPr lang="en-US" smtClean="0"/>
+              <a:pPr>
+                <a:defRPr/>
+              </a:pPr>
+              <a:t>31</a:t>
+            </a:fld>
+            <a:endParaRPr lang="en-US"/>
+          </a:p>
+        </p:txBody>
+      </p:sp>
+    </p:spTree>
+    <p:extLst>
+      <p:ext uri="{BB962C8B-B14F-4D97-AF65-F5344CB8AC3E}">
+        <p14:creationId xmlns:p14="http://schemas.microsoft.com/office/powerpoint/2010/main" val="3622917272"/>
+      </p:ext>
+    </p:extLst>
+  </p:cSld>
+  <p:clrMapOvr>
+    <a:masterClrMapping/>
+  </p:clrMapOvr>
+</p:sld>
+</file>
+
+<file path=ppt/slides/slide32.xml><?xml version="1.0" encoding="utf-8"?>
+<p:sld xmlns:a="http://schemas.openxmlformats.org/drawingml/2006/main" xmlns:r="http://schemas.openxmlformats.org/officeDocument/2006/relationships" xmlns:p="http://schemas.openxmlformats.org/presentationml/2006/main">
+  <p:cSld>
+    <p:spTree>
+      <p:nvGrpSpPr>
+        <p:cNvPr id="1" name=""/>
+        <p:cNvGrpSpPr/>
+        <p:nvPr/>
+      </p:nvGrpSpPr>
+      <p:grpSpPr>
+        <a:xfrm>
+          <a:off x="0" y="0"/>
+          <a:ext cx="0" cy="0"/>
+          <a:chOff x="0" y="0"/>
+          <a:chExt cx="0" cy="0"/>
+        </a:xfrm>
+      </p:grpSpPr>
+      <p:sp>
+        <p:nvSpPr>
+          <p:cNvPr id="2" name="Title 1"/>
+          <p:cNvSpPr>
+            <a:spLocks noGrp="1"/>
+          </p:cNvSpPr>
+          <p:nvPr>
+            <p:ph type="title"/>
+          </p:nvPr>
+        </p:nvSpPr>
+        <p:spPr>
+          <a:xfrm>
             <a:off x="502920" y="644208"/>
             <a:ext cx="9052560" cy="1210839"/>
           </a:xfrm>
@@ -14687,7 +14944,7 @@
               <a:pPr>
                 <a:defRPr/>
               </a:pPr>
-              <a:t>30</a:t>
+              <a:t>32</a:t>
             </a:fld>
             <a:endParaRPr lang="en-US"/>
           </a:p>
@@ -14773,7 +15030,7 @@
         </p:spPr>
         <p:txBody>
           <a:bodyPr>
-            <a:normAutofit fontScale="92500" lnSpcReduction="20000"/>
+            <a:normAutofit fontScale="85000" lnSpcReduction="20000"/>
           </a:bodyPr>
           <a:lstStyle/>
           <a:p>
@@ -14842,8 +15099,20 @@
             <a:pPr lvl="1"/>
             <a:r>
               <a:rPr lang="en-US" dirty="0" smtClean="0"/>
-              <a:t>local SRAM consumes too much silicon</a:t>
-            </a:r>
+              <a:t>local SRAM consumes too much </a:t>
+            </a:r>
+            <a:r>
+              <a:rPr lang="en-US" dirty="0" smtClean="0"/>
+              <a:t>silicon</a:t>
+            </a:r>
+          </a:p>
+          <a:p>
+            <a:pPr lvl="1"/>
+            <a:r>
+              <a:rPr lang="en-US" dirty="0" smtClean="0"/>
+              <a:t>locally and fully connected networks are bandwidth limited</a:t>
+            </a:r>
+            <a:endParaRPr lang="en-US" dirty="0" smtClean="0"/>
           </a:p>
           <a:p>
             <a:r>
@@ -14896,16 +15165,7 @@
                 </a:solidFill>
                 <a:cs typeface="Monaco"/>
               </a:rPr>
-              <a:t>and/or specific </a:t>
-            </a:r>
-            <a:r>
-              <a:rPr lang="en-US" dirty="0" smtClean="0">
-                <a:solidFill>
-                  <a:srgbClr val="000000"/>
-                </a:solidFill>
-                <a:cs typeface="Monaco"/>
-              </a:rPr>
-              <a:t>NN’s</a:t>
+              <a:t>and/or specific NN’s</a:t>
             </a:r>
           </a:p>
           <a:p>
@@ -14924,12 +15184,6 @@
               </a:rPr>
               <a:t>ASIC’s often employ SRAM which consumes a high percentage of silicon</a:t>
             </a:r>
-            <a:endParaRPr lang="en-US" dirty="0" smtClean="0">
-              <a:solidFill>
-                <a:srgbClr val="000000"/>
-              </a:solidFill>
-              <a:cs typeface="Monaco"/>
-            </a:endParaRPr>
           </a:p>
           <a:p>
             <a:pPr lvl="1" fontAlgn="auto">
@@ -15141,25 +15395,28 @@
             <a:pPr lvl="1"/>
             <a:r>
               <a:rPr lang="en-US" dirty="0" smtClean="0"/>
-              <a:t>minimize dependency on </a:t>
-            </a:r>
-            <a:r>
-              <a:rPr lang="en-US" dirty="0" smtClean="0"/>
-              <a:t>SRAM to allow available silicon to be focused on processing</a:t>
+              <a:t>minimize dependency on SRAM to allow available silicon to be focused on processing</a:t>
             </a:r>
           </a:p>
           <a:p>
             <a:pPr lvl="1"/>
             <a:r>
               <a:rPr lang="en-US" dirty="0" smtClean="0"/>
-              <a:t>eliminate NN size restrictions imposed by local SRAM</a:t>
-            </a:r>
-            <a:endParaRPr lang="en-US" dirty="0" smtClean="0"/>
-          </a:p>
-          <a:p>
-            <a:r>
-              <a:rPr lang="en-US" dirty="0" smtClean="0"/>
-              <a:t>Data Structures</a:t>
+              <a:t>eliminate NN size restrictions imposed by local </a:t>
+            </a:r>
+            <a:r>
+              <a:rPr lang="en-US" dirty="0" smtClean="0"/>
+              <a:t>SRAM</a:t>
+            </a:r>
+          </a:p>
+          <a:p>
+            <a:r>
+              <a:rPr lang="en-US" dirty="0" smtClean="0"/>
+              <a:t>Data </a:t>
+            </a:r>
+            <a:r>
+              <a:rPr lang="en-US" dirty="0" smtClean="0"/>
+              <a:t>Structures</a:t>
             </a:r>
           </a:p>
           <a:p>
@@ -15206,15 +15463,7 @@
             <a:pPr lvl="1"/>
             <a:r>
               <a:rPr lang="en-US" dirty="0" smtClean="0"/>
-              <a:t>avoid </a:t>
-            </a:r>
-            <a:r>
-              <a:rPr lang="en-US" dirty="0" smtClean="0"/>
-              <a:t>local memory imposing NN size </a:t>
-            </a:r>
-            <a:r>
-              <a:rPr lang="en-US" dirty="0" smtClean="0"/>
-              <a:t>limitations</a:t>
+              <a:t>avoid local memory imposing NN size limitations</a:t>
             </a:r>
           </a:p>
           <a:p>

</xml_diff>